<commit_message>
added plot for RFE
</commit_message>
<xml_diff>
--- a/UpdateMachine Learning I Short Project.pptx
+++ b/UpdateMachine Learning I Short Project.pptx
@@ -5,7 +5,7 @@
     <p:sldMasterId id="2147483648" r:id="rId4"/>
   </p:sldMasterIdLst>
   <p:notesMasterIdLst>
-    <p:notesMasterId r:id="rId23"/>
+    <p:notesMasterId r:id="rId24"/>
   </p:notesMasterIdLst>
   <p:sldIdLst>
     <p:sldId id="256" r:id="rId5"/>
@@ -21,11 +21,12 @@
     <p:sldId id="263" r:id="rId15"/>
     <p:sldId id="264" r:id="rId16"/>
     <p:sldId id="265" r:id="rId17"/>
-    <p:sldId id="267" r:id="rId18"/>
-    <p:sldId id="266" r:id="rId19"/>
-    <p:sldId id="269" r:id="rId20"/>
-    <p:sldId id="268" r:id="rId21"/>
-    <p:sldId id="270" r:id="rId22"/>
+    <p:sldId id="274" r:id="rId18"/>
+    <p:sldId id="267" r:id="rId19"/>
+    <p:sldId id="266" r:id="rId20"/>
+    <p:sldId id="269" r:id="rId21"/>
+    <p:sldId id="268" r:id="rId22"/>
+    <p:sldId id="270" r:id="rId23"/>
   </p:sldIdLst>
   <p:sldSz cx="12192000" cy="6858000"/>
   <p:notesSz cx="6858000" cy="9144000"/>
@@ -1204,11 +1205,35 @@
           <a:p>
             <a:r>
               <a:rPr lang="pl-PL" dirty="0"/>
-              <a:t>Same as </a:t>
+              <a:t>Plot </a:t>
             </a:r>
             <a:r>
               <a:rPr lang="pl-PL" dirty="0" err="1"/>
-              <a:t>ridge</a:t>
+              <a:t>larger</a:t>
+            </a:r>
+            <a:r>
+              <a:rPr lang="pl-PL" dirty="0"/>
+              <a:t>, one </a:t>
+            </a:r>
+            <a:r>
+              <a:rPr lang="pl-PL" dirty="0" err="1"/>
+              <a:t>score</a:t>
+            </a:r>
+            <a:r>
+              <a:rPr lang="pl-PL" dirty="0"/>
+              <a:t> (R2?), </a:t>
+            </a:r>
+            <a:r>
+              <a:rPr lang="pl-PL" dirty="0" err="1"/>
+              <a:t>round</a:t>
+            </a:r>
+            <a:r>
+              <a:rPr lang="pl-PL" dirty="0"/>
+              <a:t> the </a:t>
+            </a:r>
+            <a:r>
+              <a:rPr lang="pl-PL" dirty="0" err="1"/>
+              <a:t>scores</a:t>
             </a:r>
             <a:endParaRPr lang="pl-PL" dirty="0"/>
           </a:p>
@@ -1246,6 +1271,104 @@
     </p:spTree>
     <p:extLst>
       <p:ext uri="{BB962C8B-B14F-4D97-AF65-F5344CB8AC3E}">
+        <p14:creationId xmlns:p14="http://schemas.microsoft.com/office/powerpoint/2010/main" val="1658899915"/>
+      </p:ext>
+    </p:extLst>
+  </p:cSld>
+  <p:clrMapOvr>
+    <a:masterClrMapping/>
+  </p:clrMapOvr>
+</p:notes>
+</file>
+
+<file path=ppt/notesSlides/notesSlide15.xml><?xml version="1.0" encoding="utf-8"?>
+<p:notes xmlns:a="http://schemas.openxmlformats.org/drawingml/2006/main" xmlns:r="http://schemas.openxmlformats.org/officeDocument/2006/relationships" xmlns:p="http://schemas.openxmlformats.org/presentationml/2006/main">
+  <p:cSld>
+    <p:spTree>
+      <p:nvGrpSpPr>
+        <p:cNvPr id="1" name=""/>
+        <p:cNvGrpSpPr/>
+        <p:nvPr/>
+      </p:nvGrpSpPr>
+      <p:grpSpPr>
+        <a:xfrm>
+          <a:off x="0" y="0"/>
+          <a:ext cx="0" cy="0"/>
+          <a:chOff x="0" y="0"/>
+          <a:chExt cx="0" cy="0"/>
+        </a:xfrm>
+      </p:grpSpPr>
+      <p:sp>
+        <p:nvSpPr>
+          <p:cNvPr id="2" name="Slide Image Placeholder 1"/>
+          <p:cNvSpPr>
+            <a:spLocks noGrp="1" noRot="1" noChangeAspect="1"/>
+          </p:cNvSpPr>
+          <p:nvPr>
+            <p:ph type="sldImg"/>
+          </p:nvPr>
+        </p:nvSpPr>
+        <p:spPr/>
+      </p:sp>
+      <p:sp>
+        <p:nvSpPr>
+          <p:cNvPr id="3" name="Notes Placeholder 2"/>
+          <p:cNvSpPr>
+            <a:spLocks noGrp="1"/>
+          </p:cNvSpPr>
+          <p:nvPr>
+            <p:ph type="body" idx="1"/>
+          </p:nvPr>
+        </p:nvSpPr>
+        <p:spPr/>
+        <p:txBody>
+          <a:bodyPr/>
+          <a:lstStyle/>
+          <a:p>
+            <a:r>
+              <a:rPr lang="pl-PL" dirty="0"/>
+              <a:t>Same as </a:t>
+            </a:r>
+            <a:r>
+              <a:rPr lang="pl-PL" dirty="0" err="1"/>
+              <a:t>ridge</a:t>
+            </a:r>
+            <a:endParaRPr lang="pl-PL" dirty="0"/>
+          </a:p>
+          <a:p>
+            <a:r>
+              <a:rPr lang="en-US" dirty="0"/>
+              <a:t>Scores with best alpha at 10</a:t>
+            </a:r>
+          </a:p>
+        </p:txBody>
+      </p:sp>
+      <p:sp>
+        <p:nvSpPr>
+          <p:cNvPr id="4" name="Slide Number Placeholder 3"/>
+          <p:cNvSpPr>
+            <a:spLocks noGrp="1"/>
+          </p:cNvSpPr>
+          <p:nvPr>
+            <p:ph type="sldNum" sz="quarter" idx="5"/>
+          </p:nvPr>
+        </p:nvSpPr>
+        <p:spPr/>
+        <p:txBody>
+          <a:bodyPr/>
+          <a:lstStyle/>
+          <a:p>
+            <a:fld id="{E1DAF758-79EF-40A8-B313-F33FB4F06C02}" type="slidenum">
+              <a:rPr lang="tr-TR" smtClean="0"/>
+              <a:t>15</a:t>
+            </a:fld>
+            <a:endParaRPr lang="tr-TR"/>
+          </a:p>
+        </p:txBody>
+      </p:sp>
+    </p:spTree>
+    <p:extLst>
+      <p:ext uri="{BB962C8B-B14F-4D97-AF65-F5344CB8AC3E}">
         <p14:creationId xmlns:p14="http://schemas.microsoft.com/office/powerpoint/2010/main" val="785283360"/>
       </p:ext>
     </p:extLst>
@@ -1256,7 +1379,7 @@
 </p:notes>
 </file>
 
-<file path=ppt/notesSlides/notesSlide15.xml><?xml version="1.0" encoding="utf-8"?>
+<file path=ppt/notesSlides/notesSlide16.xml><?xml version="1.0" encoding="utf-8"?>
 <p:notes xmlns:a="http://schemas.openxmlformats.org/drawingml/2006/main" xmlns:r="http://schemas.openxmlformats.org/officeDocument/2006/relationships" xmlns:p="http://schemas.openxmlformats.org/presentationml/2006/main">
   <p:cSld>
     <p:spTree>
@@ -1369,7 +1492,7 @@
           <a:p>
             <a:fld id="{E1DAF758-79EF-40A8-B313-F33FB4F06C02}" type="slidenum">
               <a:rPr lang="tr-TR" smtClean="0"/>
-              <a:t>15</a:t>
+              <a:t>16</a:t>
             </a:fld>
             <a:endParaRPr lang="tr-TR"/>
           </a:p>
@@ -1388,7 +1511,7 @@
 </p:notes>
 </file>
 
-<file path=ppt/notesSlides/notesSlide16.xml><?xml version="1.0" encoding="utf-8"?>
+<file path=ppt/notesSlides/notesSlide17.xml><?xml version="1.0" encoding="utf-8"?>
 <p:notes xmlns:a="http://schemas.openxmlformats.org/drawingml/2006/main" xmlns:r="http://schemas.openxmlformats.org/officeDocument/2006/relationships" xmlns:p="http://schemas.openxmlformats.org/presentationml/2006/main">
   <p:cSld>
     <p:spTree>
@@ -1453,7 +1576,7 @@
           <a:p>
             <a:fld id="{E1DAF758-79EF-40A8-B313-F33FB4F06C02}" type="slidenum">
               <a:rPr lang="tr-TR" smtClean="0"/>
-              <a:t>18</a:t>
+              <a:t>19</a:t>
             </a:fld>
             <a:endParaRPr lang="tr-TR"/>
           </a:p>
@@ -3022,7 +3145,7 @@
           <a:noFill/>
           <a:extLst>
             <a:ext uri="{909E8E84-426E-40dd-AFC4-6F175D3DCCD1}">
-              <a14:hiddenFill xmlns="" xmlns:a14="http://schemas.microsoft.com/office/drawing/2010/main">
+              <a14:hiddenFill xmlns:a14="http://schemas.microsoft.com/office/drawing/2010/main" xmlns="">
                 <a:solidFill>
                   <a:srgbClr val="FFFFFF"/>
                 </a:solidFill>
@@ -3081,7 +3204,7 @@
             </a:ln>
             <a:extLst>
               <a:ext uri="{91240B29-F687-4f45-9708-019B960494DF}">
-                <a14:hiddenLine xmlns="" xmlns:a14="http://schemas.microsoft.com/office/drawing/2010/main" w="9525">
+                <a14:hiddenLine xmlns:a14="http://schemas.microsoft.com/office/drawing/2010/main" xmlns="" w="9525">
                   <a:solidFill>
                     <a:srgbClr val="000000"/>
                   </a:solidFill>
@@ -3171,7 +3294,7 @@
             </a:ln>
             <a:extLst>
               <a:ext uri="{91240B29-F687-4f45-9708-019B960494DF}">
-                <a14:hiddenLine xmlns="" xmlns:a14="http://schemas.microsoft.com/office/drawing/2010/main" w="9525">
+                <a14:hiddenLine xmlns:a14="http://schemas.microsoft.com/office/drawing/2010/main" xmlns="" w="9525">
                   <a:solidFill>
                     <a:srgbClr val="000000"/>
                   </a:solidFill>
@@ -3261,7 +3384,7 @@
             </a:ln>
             <a:extLst>
               <a:ext uri="{91240B29-F687-4f45-9708-019B960494DF}">
-                <a14:hiddenLine xmlns="" xmlns:a14="http://schemas.microsoft.com/office/drawing/2010/main" w="9525">
+                <a14:hiddenLine xmlns:a14="http://schemas.microsoft.com/office/drawing/2010/main" xmlns="" w="9525">
                   <a:solidFill>
                     <a:srgbClr val="000000"/>
                   </a:solidFill>
@@ -3295,7 +3418,7 @@
             </a:ln>
             <a:extLst>
               <a:ext uri="{91240B29-F687-4f45-9708-019B960494DF}">
-                <a14:hiddenLine xmlns="" xmlns:a14="http://schemas.microsoft.com/office/drawing/2010/main" w="9525">
+                <a14:hiddenLine xmlns:a14="http://schemas.microsoft.com/office/drawing/2010/main" xmlns="" w="9525">
                   <a:solidFill>
                     <a:srgbClr val="000000"/>
                   </a:solidFill>
@@ -3385,7 +3508,7 @@
             </a:ln>
             <a:extLst>
               <a:ext uri="{91240B29-F687-4f45-9708-019B960494DF}">
-                <a14:hiddenLine xmlns="" xmlns:a14="http://schemas.microsoft.com/office/drawing/2010/main" w="9525">
+                <a14:hiddenLine xmlns:a14="http://schemas.microsoft.com/office/drawing/2010/main" xmlns="" w="9525">
                   <a:solidFill>
                     <a:srgbClr val="000000"/>
                   </a:solidFill>
@@ -3447,7 +3570,7 @@
             </a:ln>
             <a:extLst>
               <a:ext uri="{91240B29-F687-4f45-9708-019B960494DF}">
-                <a14:hiddenLine xmlns="" xmlns:a14="http://schemas.microsoft.com/office/drawing/2010/main" w="9525">
+                <a14:hiddenLine xmlns:a14="http://schemas.microsoft.com/office/drawing/2010/main" xmlns="" w="9525">
                   <a:solidFill>
                     <a:srgbClr val="000000"/>
                   </a:solidFill>
@@ -3509,7 +3632,7 @@
             </a:ln>
             <a:extLst>
               <a:ext uri="{91240B29-F687-4f45-9708-019B960494DF}">
-                <a14:hiddenLine xmlns="" xmlns:a14="http://schemas.microsoft.com/office/drawing/2010/main" w="9525">
+                <a14:hiddenLine xmlns:a14="http://schemas.microsoft.com/office/drawing/2010/main" xmlns="" w="9525">
                   <a:solidFill>
                     <a:srgbClr val="000000"/>
                   </a:solidFill>
@@ -3599,7 +3722,7 @@
             </a:ln>
             <a:extLst>
               <a:ext uri="{91240B29-F687-4f45-9708-019B960494DF}">
-                <a14:hiddenLine xmlns="" xmlns:a14="http://schemas.microsoft.com/office/drawing/2010/main" w="9525">
+                <a14:hiddenLine xmlns:a14="http://schemas.microsoft.com/office/drawing/2010/main" xmlns="" w="9525">
                   <a:solidFill>
                     <a:srgbClr val="000000"/>
                   </a:solidFill>
@@ -3661,7 +3784,7 @@
             </a:ln>
             <a:extLst>
               <a:ext uri="{91240B29-F687-4f45-9708-019B960494DF}">
-                <a14:hiddenLine xmlns="" xmlns:a14="http://schemas.microsoft.com/office/drawing/2010/main" w="9525">
+                <a14:hiddenLine xmlns:a14="http://schemas.microsoft.com/office/drawing/2010/main" xmlns="" w="9525">
                   <a:solidFill>
                     <a:srgbClr val="000000"/>
                   </a:solidFill>
@@ -3723,7 +3846,7 @@
             </a:ln>
             <a:extLst>
               <a:ext uri="{91240B29-F687-4f45-9708-019B960494DF}">
-                <a14:hiddenLine xmlns="" xmlns:a14="http://schemas.microsoft.com/office/drawing/2010/main" w="9525">
+                <a14:hiddenLine xmlns:a14="http://schemas.microsoft.com/office/drawing/2010/main" xmlns="" w="9525">
                   <a:solidFill>
                     <a:srgbClr val="000000"/>
                   </a:solidFill>
@@ -3813,7 +3936,7 @@
             </a:ln>
             <a:extLst>
               <a:ext uri="{91240B29-F687-4f45-9708-019B960494DF}">
-                <a14:hiddenLine xmlns="" xmlns:a14="http://schemas.microsoft.com/office/drawing/2010/main" w="9525">
+                <a14:hiddenLine xmlns:a14="http://schemas.microsoft.com/office/drawing/2010/main" xmlns="" w="9525">
                   <a:solidFill>
                     <a:srgbClr val="000000"/>
                   </a:solidFill>
@@ -3903,7 +4026,7 @@
             </a:ln>
             <a:extLst>
               <a:ext uri="{91240B29-F687-4f45-9708-019B960494DF}">
-                <a14:hiddenLine xmlns="" xmlns:a14="http://schemas.microsoft.com/office/drawing/2010/main" w="9525">
+                <a14:hiddenLine xmlns:a14="http://schemas.microsoft.com/office/drawing/2010/main" xmlns="" w="9525">
                   <a:solidFill>
                     <a:srgbClr val="000000"/>
                   </a:solidFill>
@@ -3965,7 +4088,7 @@
             </a:ln>
             <a:extLst>
               <a:ext uri="{91240B29-F687-4f45-9708-019B960494DF}">
-                <a14:hiddenLine xmlns="" xmlns:a14="http://schemas.microsoft.com/office/drawing/2010/main" w="9525">
+                <a14:hiddenLine xmlns:a14="http://schemas.microsoft.com/office/drawing/2010/main" xmlns="" w="9525">
                   <a:solidFill>
                     <a:srgbClr val="000000"/>
                   </a:solidFill>
@@ -4075,7 +4198,7 @@
             </a:ln>
             <a:extLst>
               <a:ext uri="{91240B29-F687-4f45-9708-019B960494DF}">
-                <a14:hiddenLine xmlns="" xmlns:a14="http://schemas.microsoft.com/office/drawing/2010/main" w="9525">
+                <a14:hiddenLine xmlns:a14="http://schemas.microsoft.com/office/drawing/2010/main" xmlns="" w="9525">
                   <a:solidFill>
                     <a:srgbClr val="000000"/>
                   </a:solidFill>
@@ -4137,7 +4260,7 @@
             </a:ln>
             <a:extLst>
               <a:ext uri="{91240B29-F687-4f45-9708-019B960494DF}">
-                <a14:hiddenLine xmlns="" xmlns:a14="http://schemas.microsoft.com/office/drawing/2010/main" w="9525">
+                <a14:hiddenLine xmlns:a14="http://schemas.microsoft.com/office/drawing/2010/main" xmlns="" w="9525">
                   <a:solidFill>
                     <a:srgbClr val="000000"/>
                   </a:solidFill>
@@ -4227,7 +4350,7 @@
             </a:ln>
             <a:extLst>
               <a:ext uri="{91240B29-F687-4f45-9708-019B960494DF}">
-                <a14:hiddenLine xmlns="" xmlns:a14="http://schemas.microsoft.com/office/drawing/2010/main" w="9525">
+                <a14:hiddenLine xmlns:a14="http://schemas.microsoft.com/office/drawing/2010/main" xmlns="" w="9525">
                   <a:solidFill>
                     <a:srgbClr val="000000"/>
                   </a:solidFill>
@@ -4317,7 +4440,7 @@
             </a:ln>
             <a:extLst>
               <a:ext uri="{91240B29-F687-4f45-9708-019B960494DF}">
-                <a14:hiddenLine xmlns="" xmlns:a14="http://schemas.microsoft.com/office/drawing/2010/main" w="9525">
+                <a14:hiddenLine xmlns:a14="http://schemas.microsoft.com/office/drawing/2010/main" xmlns="" w="9525">
                   <a:solidFill>
                     <a:srgbClr val="000000"/>
                   </a:solidFill>
@@ -4379,7 +4502,7 @@
             </a:ln>
             <a:extLst>
               <a:ext uri="{91240B29-F687-4f45-9708-019B960494DF}">
-                <a14:hiddenLine xmlns="" xmlns:a14="http://schemas.microsoft.com/office/drawing/2010/main" w="9525">
+                <a14:hiddenLine xmlns:a14="http://schemas.microsoft.com/office/drawing/2010/main" xmlns="" w="9525">
                   <a:solidFill>
                     <a:srgbClr val="000000"/>
                   </a:solidFill>
@@ -4469,7 +4592,7 @@
             </a:ln>
             <a:extLst>
               <a:ext uri="{91240B29-F687-4f45-9708-019B960494DF}">
-                <a14:hiddenLine xmlns="" xmlns:a14="http://schemas.microsoft.com/office/drawing/2010/main" w="9525">
+                <a14:hiddenLine xmlns:a14="http://schemas.microsoft.com/office/drawing/2010/main" xmlns="" w="9525">
                   <a:solidFill>
                     <a:srgbClr val="000000"/>
                   </a:solidFill>
@@ -4559,7 +4682,7 @@
             </a:ln>
             <a:extLst>
               <a:ext uri="{91240B29-F687-4f45-9708-019B960494DF}">
-                <a14:hiddenLine xmlns="" xmlns:a14="http://schemas.microsoft.com/office/drawing/2010/main" w="9525">
+                <a14:hiddenLine xmlns:a14="http://schemas.microsoft.com/office/drawing/2010/main" xmlns="" w="9525">
                   <a:solidFill>
                     <a:srgbClr val="000000"/>
                   </a:solidFill>
@@ -4615,7 +4738,7 @@
             </a:ln>
             <a:extLst>
               <a:ext uri="{91240B29-F687-4f45-9708-019B960494DF}">
-                <a14:hiddenLine xmlns="" xmlns:a14="http://schemas.microsoft.com/office/drawing/2010/main" w="9525">
+                <a14:hiddenLine xmlns:a14="http://schemas.microsoft.com/office/drawing/2010/main" xmlns="" w="9525">
                   <a:solidFill>
                     <a:srgbClr val="000000"/>
                   </a:solidFill>
@@ -4705,7 +4828,7 @@
             </a:ln>
             <a:extLst>
               <a:ext uri="{91240B29-F687-4f45-9708-019B960494DF}">
-                <a14:hiddenLine xmlns="" xmlns:a14="http://schemas.microsoft.com/office/drawing/2010/main" w="9525">
+                <a14:hiddenLine xmlns:a14="http://schemas.microsoft.com/office/drawing/2010/main" xmlns="" w="9525">
                   <a:solidFill>
                     <a:srgbClr val="000000"/>
                   </a:solidFill>
@@ -4761,7 +4884,7 @@
             </a:ln>
             <a:extLst>
               <a:ext uri="{91240B29-F687-4f45-9708-019B960494DF}">
-                <a14:hiddenLine xmlns="" xmlns:a14="http://schemas.microsoft.com/office/drawing/2010/main" w="9525">
+                <a14:hiddenLine xmlns:a14="http://schemas.microsoft.com/office/drawing/2010/main" xmlns="" w="9525">
                   <a:solidFill>
                     <a:srgbClr val="000000"/>
                   </a:solidFill>
@@ -4851,7 +4974,7 @@
             </a:ln>
             <a:extLst>
               <a:ext uri="{91240B29-F687-4f45-9708-019B960494DF}">
-                <a14:hiddenLine xmlns="" xmlns:a14="http://schemas.microsoft.com/office/drawing/2010/main" w="9525">
+                <a14:hiddenLine xmlns:a14="http://schemas.microsoft.com/office/drawing/2010/main" xmlns="" w="9525">
                   <a:solidFill>
                     <a:srgbClr val="000000"/>
                   </a:solidFill>
@@ -4919,7 +5042,7 @@
             </a:ln>
             <a:extLst>
               <a:ext uri="{91240B29-F687-4f45-9708-019B960494DF}">
-                <a14:hiddenLine xmlns="" xmlns:a14="http://schemas.microsoft.com/office/drawing/2010/main" w="9525">
+                <a14:hiddenLine xmlns:a14="http://schemas.microsoft.com/office/drawing/2010/main" xmlns="" w="9525">
                   <a:solidFill>
                     <a:srgbClr val="000000"/>
                   </a:solidFill>
@@ -5009,7 +5132,7 @@
             </a:ln>
             <a:extLst>
               <a:ext uri="{91240B29-F687-4f45-9708-019B960494DF}">
-                <a14:hiddenLine xmlns="" xmlns:a14="http://schemas.microsoft.com/office/drawing/2010/main" w="9525">
+                <a14:hiddenLine xmlns:a14="http://schemas.microsoft.com/office/drawing/2010/main" xmlns="" w="9525">
                   <a:solidFill>
                     <a:srgbClr val="000000"/>
                   </a:solidFill>
@@ -5077,7 +5200,7 @@
             </a:ln>
             <a:extLst>
               <a:ext uri="{91240B29-F687-4f45-9708-019B960494DF}">
-                <a14:hiddenLine xmlns="" xmlns:a14="http://schemas.microsoft.com/office/drawing/2010/main" w="9525">
+                <a14:hiddenLine xmlns:a14="http://schemas.microsoft.com/office/drawing/2010/main" xmlns="" w="9525">
                   <a:solidFill>
                     <a:srgbClr val="000000"/>
                   </a:solidFill>
@@ -5167,7 +5290,7 @@
             </a:ln>
             <a:extLst>
               <a:ext uri="{91240B29-F687-4f45-9708-019B960494DF}">
-                <a14:hiddenLine xmlns="" xmlns:a14="http://schemas.microsoft.com/office/drawing/2010/main" w="9525">
+                <a14:hiddenLine xmlns:a14="http://schemas.microsoft.com/office/drawing/2010/main" xmlns="" w="9525">
                   <a:solidFill>
                     <a:srgbClr val="000000"/>
                   </a:solidFill>
@@ -5201,7 +5324,7 @@
             </a:ln>
             <a:extLst>
               <a:ext uri="{91240B29-F687-4f45-9708-019B960494DF}">
-                <a14:hiddenLine xmlns="" xmlns:a14="http://schemas.microsoft.com/office/drawing/2010/main" w="9525">
+                <a14:hiddenLine xmlns:a14="http://schemas.microsoft.com/office/drawing/2010/main" xmlns="" w="9525">
                   <a:solidFill>
                     <a:srgbClr val="000000"/>
                   </a:solidFill>
@@ -5291,7 +5414,7 @@
             </a:ln>
             <a:extLst>
               <a:ext uri="{91240B29-F687-4f45-9708-019B960494DF}">
-                <a14:hiddenLine xmlns="" xmlns:a14="http://schemas.microsoft.com/office/drawing/2010/main" w="9525">
+                <a14:hiddenLine xmlns:a14="http://schemas.microsoft.com/office/drawing/2010/main" xmlns="" w="9525">
                   <a:solidFill>
                     <a:srgbClr val="000000"/>
                   </a:solidFill>
@@ -5353,7 +5476,7 @@
             </a:ln>
             <a:extLst>
               <a:ext uri="{91240B29-F687-4f45-9708-019B960494DF}">
-                <a14:hiddenLine xmlns="" xmlns:a14="http://schemas.microsoft.com/office/drawing/2010/main" w="9525">
+                <a14:hiddenLine xmlns:a14="http://schemas.microsoft.com/office/drawing/2010/main" xmlns="" w="9525">
                   <a:solidFill>
                     <a:srgbClr val="000000"/>
                   </a:solidFill>
@@ -5415,7 +5538,7 @@
             </a:ln>
             <a:extLst>
               <a:ext uri="{91240B29-F687-4f45-9708-019B960494DF}">
-                <a14:hiddenLine xmlns="" xmlns:a14="http://schemas.microsoft.com/office/drawing/2010/main" w="9525">
+                <a14:hiddenLine xmlns:a14="http://schemas.microsoft.com/office/drawing/2010/main" xmlns="" w="9525">
                   <a:solidFill>
                     <a:srgbClr val="000000"/>
                   </a:solidFill>
@@ -5505,7 +5628,7 @@
             </a:ln>
             <a:extLst>
               <a:ext uri="{91240B29-F687-4f45-9708-019B960494DF}">
-                <a14:hiddenLine xmlns="" xmlns:a14="http://schemas.microsoft.com/office/drawing/2010/main" w="9525">
+                <a14:hiddenLine xmlns:a14="http://schemas.microsoft.com/office/drawing/2010/main" xmlns="" w="9525">
                   <a:solidFill>
                     <a:srgbClr val="000000"/>
                   </a:solidFill>
@@ -5573,7 +5696,7 @@
             </a:ln>
             <a:extLst>
               <a:ext uri="{91240B29-F687-4f45-9708-019B960494DF}">
-                <a14:hiddenLine xmlns="" xmlns:a14="http://schemas.microsoft.com/office/drawing/2010/main" w="9525">
+                <a14:hiddenLine xmlns:a14="http://schemas.microsoft.com/office/drawing/2010/main" xmlns="" w="9525">
                   <a:solidFill>
                     <a:srgbClr val="000000"/>
                   </a:solidFill>
@@ -5635,7 +5758,7 @@
             </a:ln>
             <a:extLst>
               <a:ext uri="{91240B29-F687-4f45-9708-019B960494DF}">
-                <a14:hiddenLine xmlns="" xmlns:a14="http://schemas.microsoft.com/office/drawing/2010/main" w="9525">
+                <a14:hiddenLine xmlns:a14="http://schemas.microsoft.com/office/drawing/2010/main" xmlns="" w="9525">
                   <a:solidFill>
                     <a:srgbClr val="000000"/>
                   </a:solidFill>
@@ -5725,7 +5848,7 @@
             </a:ln>
             <a:extLst>
               <a:ext uri="{91240B29-F687-4f45-9708-019B960494DF}">
-                <a14:hiddenLine xmlns="" xmlns:a14="http://schemas.microsoft.com/office/drawing/2010/main" w="9525">
+                <a14:hiddenLine xmlns:a14="http://schemas.microsoft.com/office/drawing/2010/main" xmlns="" w="9525">
                   <a:solidFill>
                     <a:srgbClr val="000000"/>
                   </a:solidFill>
@@ -5787,7 +5910,7 @@
             </a:ln>
             <a:extLst>
               <a:ext uri="{91240B29-F687-4f45-9708-019B960494DF}">
-                <a14:hiddenLine xmlns="" xmlns:a14="http://schemas.microsoft.com/office/drawing/2010/main" w="9525">
+                <a14:hiddenLine xmlns:a14="http://schemas.microsoft.com/office/drawing/2010/main" xmlns="" w="9525">
                   <a:solidFill>
                     <a:srgbClr val="000000"/>
                   </a:solidFill>
@@ -5877,7 +6000,7 @@
             </a:ln>
             <a:extLst>
               <a:ext uri="{91240B29-F687-4f45-9708-019B960494DF}">
-                <a14:hiddenLine xmlns="" xmlns:a14="http://schemas.microsoft.com/office/drawing/2010/main" w="9525">
+                <a14:hiddenLine xmlns:a14="http://schemas.microsoft.com/office/drawing/2010/main" xmlns="" w="9525">
                   <a:solidFill>
                     <a:srgbClr val="000000"/>
                   </a:solidFill>
@@ -5939,7 +6062,7 @@
             </a:ln>
             <a:extLst>
               <a:ext uri="{91240B29-F687-4f45-9708-019B960494DF}">
-                <a14:hiddenLine xmlns="" xmlns:a14="http://schemas.microsoft.com/office/drawing/2010/main" w="9525">
+                <a14:hiddenLine xmlns:a14="http://schemas.microsoft.com/office/drawing/2010/main" xmlns="" w="9525">
                   <a:solidFill>
                     <a:srgbClr val="000000"/>
                   </a:solidFill>
@@ -6029,7 +6152,7 @@
             </a:ln>
             <a:extLst>
               <a:ext uri="{91240B29-F687-4f45-9708-019B960494DF}">
-                <a14:hiddenLine xmlns="" xmlns:a14="http://schemas.microsoft.com/office/drawing/2010/main" w="9525">
+                <a14:hiddenLine xmlns:a14="http://schemas.microsoft.com/office/drawing/2010/main" xmlns="" w="9525">
                   <a:solidFill>
                     <a:srgbClr val="000000"/>
                   </a:solidFill>
@@ -6063,7 +6186,7 @@
             </a:ln>
             <a:extLst>
               <a:ext uri="{91240B29-F687-4f45-9708-019B960494DF}">
-                <a14:hiddenLine xmlns="" xmlns:a14="http://schemas.microsoft.com/office/drawing/2010/main" w="9525">
+                <a14:hiddenLine xmlns:a14="http://schemas.microsoft.com/office/drawing/2010/main" xmlns="" w="9525">
                   <a:solidFill>
                     <a:srgbClr val="000000"/>
                   </a:solidFill>
@@ -6128,7 +6251,7 @@
             </a:ln>
             <a:extLst>
               <a:ext uri="{91240B29-F687-4f45-9708-019B960494DF}">
-                <a14:hiddenLine xmlns="" xmlns:a14="http://schemas.microsoft.com/office/drawing/2010/main" w="9525">
+                <a14:hiddenLine xmlns:a14="http://schemas.microsoft.com/office/drawing/2010/main" xmlns="" w="9525">
                   <a:solidFill>
                     <a:srgbClr val="000000"/>
                   </a:solidFill>
@@ -6218,7 +6341,7 @@
             </a:ln>
             <a:extLst>
               <a:ext uri="{91240B29-F687-4f45-9708-019B960494DF}">
-                <a14:hiddenLine xmlns="" xmlns:a14="http://schemas.microsoft.com/office/drawing/2010/main" w="9525">
+                <a14:hiddenLine xmlns:a14="http://schemas.microsoft.com/office/drawing/2010/main" xmlns="" w="9525">
                   <a:solidFill>
                     <a:srgbClr val="000000"/>
                   </a:solidFill>
@@ -6280,7 +6403,7 @@
             </a:ln>
             <a:extLst>
               <a:ext uri="{91240B29-F687-4f45-9708-019B960494DF}">
-                <a14:hiddenLine xmlns="" xmlns:a14="http://schemas.microsoft.com/office/drawing/2010/main" w="9525">
+                <a14:hiddenLine xmlns:a14="http://schemas.microsoft.com/office/drawing/2010/main" xmlns="" w="9525">
                   <a:solidFill>
                     <a:srgbClr val="000000"/>
                   </a:solidFill>
@@ -6370,7 +6493,7 @@
             </a:ln>
             <a:extLst>
               <a:ext uri="{91240B29-F687-4f45-9708-019B960494DF}">
-                <a14:hiddenLine xmlns="" xmlns:a14="http://schemas.microsoft.com/office/drawing/2010/main" w="9525">
+                <a14:hiddenLine xmlns:a14="http://schemas.microsoft.com/office/drawing/2010/main" xmlns="" w="9525">
                   <a:solidFill>
                     <a:srgbClr val="000000"/>
                   </a:solidFill>
@@ -6460,7 +6583,7 @@
             </a:ln>
             <a:extLst>
               <a:ext uri="{91240B29-F687-4f45-9708-019B960494DF}">
-                <a14:hiddenLine xmlns="" xmlns:a14="http://schemas.microsoft.com/office/drawing/2010/main" w="9525">
+                <a14:hiddenLine xmlns:a14="http://schemas.microsoft.com/office/drawing/2010/main" xmlns="" w="9525">
                   <a:solidFill>
                     <a:srgbClr val="000000"/>
                   </a:solidFill>
@@ -6525,7 +6648,7 @@
             </a:ln>
             <a:extLst>
               <a:ext uri="{91240B29-F687-4f45-9708-019B960494DF}">
-                <a14:hiddenLine xmlns="" xmlns:a14="http://schemas.microsoft.com/office/drawing/2010/main" w="9525">
+                <a14:hiddenLine xmlns:a14="http://schemas.microsoft.com/office/drawing/2010/main" xmlns="" w="9525">
                   <a:solidFill>
                     <a:srgbClr val="000000"/>
                   </a:solidFill>
@@ -6587,7 +6710,7 @@
             </a:ln>
             <a:extLst>
               <a:ext uri="{91240B29-F687-4f45-9708-019B960494DF}">
-                <a14:hiddenLine xmlns="" xmlns:a14="http://schemas.microsoft.com/office/drawing/2010/main" w="9525">
+                <a14:hiddenLine xmlns:a14="http://schemas.microsoft.com/office/drawing/2010/main" xmlns="" w="9525">
                   <a:solidFill>
                     <a:srgbClr val="000000"/>
                   </a:solidFill>
@@ -6677,7 +6800,7 @@
             </a:ln>
             <a:extLst>
               <a:ext uri="{91240B29-F687-4f45-9708-019B960494DF}">
-                <a14:hiddenLine xmlns="" xmlns:a14="http://schemas.microsoft.com/office/drawing/2010/main" w="9525">
+                <a14:hiddenLine xmlns:a14="http://schemas.microsoft.com/office/drawing/2010/main" xmlns="" w="9525">
                   <a:solidFill>
                     <a:srgbClr val="000000"/>
                   </a:solidFill>
@@ -6767,7 +6890,7 @@
             </a:ln>
             <a:extLst>
               <a:ext uri="{91240B29-F687-4f45-9708-019B960494DF}">
-                <a14:hiddenLine xmlns="" xmlns:a14="http://schemas.microsoft.com/office/drawing/2010/main" w="9525">
+                <a14:hiddenLine xmlns:a14="http://schemas.microsoft.com/office/drawing/2010/main" xmlns="" w="9525">
                   <a:solidFill>
                     <a:srgbClr val="000000"/>
                   </a:solidFill>
@@ -6829,7 +6952,7 @@
             </a:ln>
             <a:extLst>
               <a:ext uri="{91240B29-F687-4f45-9708-019B960494DF}">
-                <a14:hiddenLine xmlns="" xmlns:a14="http://schemas.microsoft.com/office/drawing/2010/main" w="9525">
+                <a14:hiddenLine xmlns:a14="http://schemas.microsoft.com/office/drawing/2010/main" xmlns="" w="9525">
                   <a:solidFill>
                     <a:srgbClr val="000000"/>
                   </a:solidFill>
@@ -6949,7 +7072,7 @@
             </a:ln>
             <a:extLst>
               <a:ext uri="{91240B29-F687-4f45-9708-019B960494DF}">
-                <a14:hiddenLine xmlns="" xmlns:a14="http://schemas.microsoft.com/office/drawing/2010/main" w="9525">
+                <a14:hiddenLine xmlns:a14="http://schemas.microsoft.com/office/drawing/2010/main" xmlns="" w="9525">
                   <a:solidFill>
                     <a:srgbClr val="000000"/>
                   </a:solidFill>
@@ -7017,7 +7140,7 @@
             </a:ln>
             <a:extLst>
               <a:ext uri="{91240B29-F687-4f45-9708-019B960494DF}">
-                <a14:hiddenLine xmlns="" xmlns:a14="http://schemas.microsoft.com/office/drawing/2010/main" w="9525">
+                <a14:hiddenLine xmlns:a14="http://schemas.microsoft.com/office/drawing/2010/main" xmlns="" w="9525">
                   <a:solidFill>
                     <a:srgbClr val="000000"/>
                   </a:solidFill>
@@ -7107,7 +7230,7 @@
             </a:ln>
             <a:extLst>
               <a:ext uri="{91240B29-F687-4f45-9708-019B960494DF}">
-                <a14:hiddenLine xmlns="" xmlns:a14="http://schemas.microsoft.com/office/drawing/2010/main" w="9525">
+                <a14:hiddenLine xmlns:a14="http://schemas.microsoft.com/office/drawing/2010/main" xmlns="" w="9525">
                   <a:solidFill>
                     <a:srgbClr val="000000"/>
                   </a:solidFill>
@@ -11836,7 +11959,7 @@
           <a:noFill/>
           <a:extLst>
             <a:ext uri="{909E8E84-426E-40dd-AFC4-6F175D3DCCD1}">
-              <a14:hiddenFill xmlns="" xmlns:a14="http://schemas.microsoft.com/office/drawing/2010/main">
+              <a14:hiddenFill xmlns:a14="http://schemas.microsoft.com/office/drawing/2010/main" xmlns="">
                 <a:solidFill>
                   <a:srgbClr val="FFFFFF"/>
                 </a:solidFill>
@@ -11910,7 +12033,7 @@
               </a:ln>
               <a:extLst>
                 <a:ext uri="{91240B29-F687-4f45-9708-019B960494DF}">
-                  <a14:hiddenLine xmlns="" xmlns:a14="http://schemas.microsoft.com/office/drawing/2010/main" w="9525">
+                  <a14:hiddenLine xmlns:a14="http://schemas.microsoft.com/office/drawing/2010/main" xmlns="" w="9525">
                     <a:solidFill>
                       <a:srgbClr val="000000"/>
                     </a:solidFill>
@@ -12000,7 +12123,7 @@
               </a:ln>
               <a:extLst>
                 <a:ext uri="{91240B29-F687-4f45-9708-019B960494DF}">
-                  <a14:hiddenLine xmlns="" xmlns:a14="http://schemas.microsoft.com/office/drawing/2010/main" w="9525">
+                  <a14:hiddenLine xmlns:a14="http://schemas.microsoft.com/office/drawing/2010/main" xmlns="" w="9525">
                     <a:solidFill>
                       <a:srgbClr val="000000"/>
                     </a:solidFill>
@@ -12090,7 +12213,7 @@
               </a:ln>
               <a:extLst>
                 <a:ext uri="{91240B29-F687-4f45-9708-019B960494DF}">
-                  <a14:hiddenLine xmlns="" xmlns:a14="http://schemas.microsoft.com/office/drawing/2010/main" w="9525">
+                  <a14:hiddenLine xmlns:a14="http://schemas.microsoft.com/office/drawing/2010/main" xmlns="" w="9525">
                     <a:solidFill>
                       <a:srgbClr val="000000"/>
                     </a:solidFill>
@@ -12152,7 +12275,7 @@
               </a:ln>
               <a:extLst>
                 <a:ext uri="{91240B29-F687-4f45-9708-019B960494DF}">
-                  <a14:hiddenLine xmlns="" xmlns:a14="http://schemas.microsoft.com/office/drawing/2010/main" w="9525">
+                  <a14:hiddenLine xmlns:a14="http://schemas.microsoft.com/office/drawing/2010/main" xmlns="" w="9525">
                     <a:solidFill>
                       <a:srgbClr val="000000"/>
                     </a:solidFill>
@@ -12242,7 +12365,7 @@
               </a:ln>
               <a:extLst>
                 <a:ext uri="{91240B29-F687-4f45-9708-019B960494DF}">
-                  <a14:hiddenLine xmlns="" xmlns:a14="http://schemas.microsoft.com/office/drawing/2010/main" w="9525">
+                  <a14:hiddenLine xmlns:a14="http://schemas.microsoft.com/office/drawing/2010/main" xmlns="" w="9525">
                     <a:solidFill>
                       <a:srgbClr val="000000"/>
                     </a:solidFill>
@@ -12304,7 +12427,7 @@
               </a:ln>
               <a:extLst>
                 <a:ext uri="{91240B29-F687-4f45-9708-019B960494DF}">
-                  <a14:hiddenLine xmlns="" xmlns:a14="http://schemas.microsoft.com/office/drawing/2010/main" w="9525">
+                  <a14:hiddenLine xmlns:a14="http://schemas.microsoft.com/office/drawing/2010/main" xmlns="" w="9525">
                     <a:solidFill>
                       <a:srgbClr val="000000"/>
                     </a:solidFill>
@@ -12366,7 +12489,7 @@
               </a:ln>
               <a:extLst>
                 <a:ext uri="{91240B29-F687-4f45-9708-019B960494DF}">
-                  <a14:hiddenLine xmlns="" xmlns:a14="http://schemas.microsoft.com/office/drawing/2010/main" w="9525">
+                  <a14:hiddenLine xmlns:a14="http://schemas.microsoft.com/office/drawing/2010/main" xmlns="" w="9525">
                     <a:solidFill>
                       <a:srgbClr val="000000"/>
                     </a:solidFill>
@@ -12456,7 +12579,7 @@
               </a:ln>
               <a:extLst>
                 <a:ext uri="{91240B29-F687-4f45-9708-019B960494DF}">
-                  <a14:hiddenLine xmlns="" xmlns:a14="http://schemas.microsoft.com/office/drawing/2010/main" w="9525">
+                  <a14:hiddenLine xmlns:a14="http://schemas.microsoft.com/office/drawing/2010/main" xmlns="" w="9525">
                     <a:solidFill>
                       <a:srgbClr val="000000"/>
                     </a:solidFill>
@@ -12546,7 +12669,7 @@
               </a:ln>
               <a:extLst>
                 <a:ext uri="{91240B29-F687-4f45-9708-019B960494DF}">
-                  <a14:hiddenLine xmlns="" xmlns:a14="http://schemas.microsoft.com/office/drawing/2010/main" w="9525">
+                  <a14:hiddenLine xmlns:a14="http://schemas.microsoft.com/office/drawing/2010/main" xmlns="" w="9525">
                     <a:solidFill>
                       <a:srgbClr val="000000"/>
                     </a:solidFill>
@@ -12608,7 +12731,7 @@
               </a:ln>
               <a:extLst>
                 <a:ext uri="{91240B29-F687-4f45-9708-019B960494DF}">
-                  <a14:hiddenLine xmlns="" xmlns:a14="http://schemas.microsoft.com/office/drawing/2010/main" w="9525">
+                  <a14:hiddenLine xmlns:a14="http://schemas.microsoft.com/office/drawing/2010/main" xmlns="" w="9525">
                     <a:solidFill>
                       <a:srgbClr val="000000"/>
                     </a:solidFill>
@@ -12718,7 +12841,7 @@
               </a:ln>
               <a:extLst>
                 <a:ext uri="{91240B29-F687-4f45-9708-019B960494DF}">
-                  <a14:hiddenLine xmlns="" xmlns:a14="http://schemas.microsoft.com/office/drawing/2010/main" w="9525">
+                  <a14:hiddenLine xmlns:a14="http://schemas.microsoft.com/office/drawing/2010/main" xmlns="" w="9525">
                     <a:solidFill>
                       <a:srgbClr val="000000"/>
                     </a:solidFill>
@@ -12802,7 +12925,7 @@
               </a:ln>
               <a:extLst>
                 <a:ext uri="{91240B29-F687-4f45-9708-019B960494DF}">
-                  <a14:hiddenLine xmlns="" xmlns:a14="http://schemas.microsoft.com/office/drawing/2010/main" w="9525">
+                  <a14:hiddenLine xmlns:a14="http://schemas.microsoft.com/office/drawing/2010/main" xmlns="" w="9525">
                     <a:solidFill>
                       <a:srgbClr val="000000"/>
                     </a:solidFill>
@@ -12864,7 +12987,7 @@
               </a:ln>
               <a:extLst>
                 <a:ext uri="{91240B29-F687-4f45-9708-019B960494DF}">
-                  <a14:hiddenLine xmlns="" xmlns:a14="http://schemas.microsoft.com/office/drawing/2010/main" w="9525">
+                  <a14:hiddenLine xmlns:a14="http://schemas.microsoft.com/office/drawing/2010/main" xmlns="" w="9525">
                     <a:solidFill>
                       <a:srgbClr val="000000"/>
                     </a:solidFill>
@@ -12926,7 +13049,7 @@
               </a:ln>
               <a:extLst>
                 <a:ext uri="{91240B29-F687-4f45-9708-019B960494DF}">
-                  <a14:hiddenLine xmlns="" xmlns:a14="http://schemas.microsoft.com/office/drawing/2010/main" w="9525">
+                  <a14:hiddenLine xmlns:a14="http://schemas.microsoft.com/office/drawing/2010/main" xmlns="" w="9525">
                     <a:solidFill>
                       <a:srgbClr val="000000"/>
                     </a:solidFill>
@@ -13016,7 +13139,7 @@
               </a:ln>
               <a:extLst>
                 <a:ext uri="{91240B29-F687-4f45-9708-019B960494DF}">
-                  <a14:hiddenLine xmlns="" xmlns:a14="http://schemas.microsoft.com/office/drawing/2010/main" w="9525">
+                  <a14:hiddenLine xmlns:a14="http://schemas.microsoft.com/office/drawing/2010/main" xmlns="" w="9525">
                     <a:solidFill>
                       <a:srgbClr val="000000"/>
                     </a:solidFill>
@@ -13050,7 +13173,7 @@
               </a:ln>
               <a:extLst>
                 <a:ext uri="{91240B29-F687-4f45-9708-019B960494DF}">
-                  <a14:hiddenLine xmlns="" xmlns:a14="http://schemas.microsoft.com/office/drawing/2010/main" w="9525">
+                  <a14:hiddenLine xmlns:a14="http://schemas.microsoft.com/office/drawing/2010/main" xmlns="" w="9525">
                     <a:solidFill>
                       <a:srgbClr val="000000"/>
                     </a:solidFill>
@@ -13115,7 +13238,7 @@
               </a:ln>
               <a:extLst>
                 <a:ext uri="{91240B29-F687-4f45-9708-019B960494DF}">
-                  <a14:hiddenLine xmlns="" xmlns:a14="http://schemas.microsoft.com/office/drawing/2010/main" w="9525">
+                  <a14:hiddenLine xmlns:a14="http://schemas.microsoft.com/office/drawing/2010/main" xmlns="" w="9525">
                     <a:solidFill>
                       <a:srgbClr val="000000"/>
                     </a:solidFill>
@@ -13205,7 +13328,7 @@
               </a:ln>
               <a:extLst>
                 <a:ext uri="{91240B29-F687-4f45-9708-019B960494DF}">
-                  <a14:hiddenLine xmlns="" xmlns:a14="http://schemas.microsoft.com/office/drawing/2010/main" w="9525">
+                  <a14:hiddenLine xmlns:a14="http://schemas.microsoft.com/office/drawing/2010/main" xmlns="" w="9525">
                     <a:solidFill>
                       <a:srgbClr val="000000"/>
                     </a:solidFill>
@@ -13267,7 +13390,7 @@
               </a:ln>
               <a:extLst>
                 <a:ext uri="{91240B29-F687-4f45-9708-019B960494DF}">
-                  <a14:hiddenLine xmlns="" xmlns:a14="http://schemas.microsoft.com/office/drawing/2010/main" w="9525">
+                  <a14:hiddenLine xmlns:a14="http://schemas.microsoft.com/office/drawing/2010/main" xmlns="" w="9525">
                     <a:solidFill>
                       <a:srgbClr val="000000"/>
                     </a:solidFill>
@@ -13357,7 +13480,7 @@
               </a:ln>
               <a:extLst>
                 <a:ext uri="{91240B29-F687-4f45-9708-019B960494DF}">
-                  <a14:hiddenLine xmlns="" xmlns:a14="http://schemas.microsoft.com/office/drawing/2010/main" w="9525">
+                  <a14:hiddenLine xmlns:a14="http://schemas.microsoft.com/office/drawing/2010/main" xmlns="" w="9525">
                     <a:solidFill>
                       <a:srgbClr val="000000"/>
                     </a:solidFill>
@@ -13422,7 +13545,7 @@
               </a:ln>
               <a:extLst>
                 <a:ext uri="{91240B29-F687-4f45-9708-019B960494DF}">
-                  <a14:hiddenLine xmlns="" xmlns:a14="http://schemas.microsoft.com/office/drawing/2010/main" w="9525">
+                  <a14:hiddenLine xmlns:a14="http://schemas.microsoft.com/office/drawing/2010/main" xmlns="" w="9525">
                     <a:solidFill>
                       <a:srgbClr val="000000"/>
                     </a:solidFill>
@@ -13484,7 +13607,7 @@
               </a:ln>
               <a:extLst>
                 <a:ext uri="{91240B29-F687-4f45-9708-019B960494DF}">
-                  <a14:hiddenLine xmlns="" xmlns:a14="http://schemas.microsoft.com/office/drawing/2010/main" w="9525">
+                  <a14:hiddenLine xmlns:a14="http://schemas.microsoft.com/office/drawing/2010/main" xmlns="" w="9525">
                     <a:solidFill>
                       <a:srgbClr val="000000"/>
                     </a:solidFill>
@@ -13574,7 +13697,7 @@
               </a:ln>
               <a:extLst>
                 <a:ext uri="{91240B29-F687-4f45-9708-019B960494DF}">
-                  <a14:hiddenLine xmlns="" xmlns:a14="http://schemas.microsoft.com/office/drawing/2010/main" w="9525">
+                  <a14:hiddenLine xmlns:a14="http://schemas.microsoft.com/office/drawing/2010/main" xmlns="" w="9525">
                     <a:solidFill>
                       <a:srgbClr val="000000"/>
                     </a:solidFill>
@@ -13664,7 +13787,7 @@
               </a:ln>
               <a:extLst>
                 <a:ext uri="{91240B29-F687-4f45-9708-019B960494DF}">
-                  <a14:hiddenLine xmlns="" xmlns:a14="http://schemas.microsoft.com/office/drawing/2010/main" w="9525">
+                  <a14:hiddenLine xmlns:a14="http://schemas.microsoft.com/office/drawing/2010/main" xmlns="" w="9525">
                     <a:solidFill>
                       <a:srgbClr val="000000"/>
                     </a:solidFill>
@@ -13729,7 +13852,7 @@
               </a:ln>
               <a:extLst>
                 <a:ext uri="{91240B29-F687-4f45-9708-019B960494DF}">
-                  <a14:hiddenLine xmlns="" xmlns:a14="http://schemas.microsoft.com/office/drawing/2010/main" w="9525">
+                  <a14:hiddenLine xmlns:a14="http://schemas.microsoft.com/office/drawing/2010/main" xmlns="" w="9525">
                     <a:solidFill>
                       <a:srgbClr val="000000"/>
                     </a:solidFill>
@@ -13849,7 +13972,7 @@
               </a:ln>
               <a:extLst>
                 <a:ext uri="{91240B29-F687-4f45-9708-019B960494DF}">
-                  <a14:hiddenLine xmlns="" xmlns:a14="http://schemas.microsoft.com/office/drawing/2010/main" w="9525">
+                  <a14:hiddenLine xmlns:a14="http://schemas.microsoft.com/office/drawing/2010/main" xmlns="" w="9525">
                     <a:solidFill>
                       <a:srgbClr val="000000"/>
                     </a:solidFill>
@@ -13930,7 +14053,7 @@
               </a:ln>
               <a:extLst>
                 <a:ext uri="{91240B29-F687-4f45-9708-019B960494DF}">
-                  <a14:hiddenLine xmlns="" xmlns:a14="http://schemas.microsoft.com/office/drawing/2010/main" w="9525">
+                  <a14:hiddenLine xmlns:a14="http://schemas.microsoft.com/office/drawing/2010/main" xmlns="" w="9525">
                     <a:solidFill>
                       <a:srgbClr val="000000"/>
                     </a:solidFill>
@@ -14045,7 +14168,7 @@
               </a:ln>
               <a:extLst>
                 <a:ext uri="{91240B29-F687-4f45-9708-019B960494DF}">
-                  <a14:hiddenLine xmlns="" xmlns:a14="http://schemas.microsoft.com/office/drawing/2010/main" w="9525">
+                  <a14:hiddenLine xmlns:a14="http://schemas.microsoft.com/office/drawing/2010/main" xmlns="" w="9525">
                     <a:solidFill>
                       <a:srgbClr val="000000"/>
                     </a:solidFill>
@@ -14135,7 +14258,7 @@
               </a:ln>
               <a:extLst>
                 <a:ext uri="{91240B29-F687-4f45-9708-019B960494DF}">
-                  <a14:hiddenLine xmlns="" xmlns:a14="http://schemas.microsoft.com/office/drawing/2010/main" w="9525">
+                  <a14:hiddenLine xmlns:a14="http://schemas.microsoft.com/office/drawing/2010/main" xmlns="" w="9525">
                     <a:solidFill>
                       <a:srgbClr val="000000"/>
                     </a:solidFill>
@@ -14200,7 +14323,7 @@
               </a:ln>
               <a:extLst>
                 <a:ext uri="{91240B29-F687-4f45-9708-019B960494DF}">
-                  <a14:hiddenLine xmlns="" xmlns:a14="http://schemas.microsoft.com/office/drawing/2010/main" w="9525">
+                  <a14:hiddenLine xmlns:a14="http://schemas.microsoft.com/office/drawing/2010/main" xmlns="" w="9525">
                     <a:solidFill>
                       <a:srgbClr val="000000"/>
                     </a:solidFill>
@@ -14290,7 +14413,7 @@
               </a:ln>
               <a:extLst>
                 <a:ext uri="{91240B29-F687-4f45-9708-019B960494DF}">
-                  <a14:hiddenLine xmlns="" xmlns:a14="http://schemas.microsoft.com/office/drawing/2010/main" w="9525">
+                  <a14:hiddenLine xmlns:a14="http://schemas.microsoft.com/office/drawing/2010/main" xmlns="" w="9525">
                     <a:solidFill>
                       <a:srgbClr val="000000"/>
                     </a:solidFill>
@@ -14358,7 +14481,7 @@
               </a:ln>
               <a:extLst>
                 <a:ext uri="{91240B29-F687-4f45-9708-019B960494DF}">
-                  <a14:hiddenLine xmlns="" xmlns:a14="http://schemas.microsoft.com/office/drawing/2010/main" w="9525">
+                  <a14:hiddenLine xmlns:a14="http://schemas.microsoft.com/office/drawing/2010/main" xmlns="" w="9525">
                     <a:solidFill>
                       <a:srgbClr val="000000"/>
                     </a:solidFill>
@@ -14448,7 +14571,7 @@
               </a:ln>
               <a:extLst>
                 <a:ext uri="{91240B29-F687-4f45-9708-019B960494DF}">
-                  <a14:hiddenLine xmlns="" xmlns:a14="http://schemas.microsoft.com/office/drawing/2010/main" w="9525">
+                  <a14:hiddenLine xmlns:a14="http://schemas.microsoft.com/office/drawing/2010/main" xmlns="" w="9525">
                     <a:solidFill>
                       <a:srgbClr val="000000"/>
                     </a:solidFill>
@@ -14516,7 +14639,7 @@
               </a:ln>
               <a:extLst>
                 <a:ext uri="{91240B29-F687-4f45-9708-019B960494DF}">
-                  <a14:hiddenLine xmlns="" xmlns:a14="http://schemas.microsoft.com/office/drawing/2010/main" w="9525">
+                  <a14:hiddenLine xmlns:a14="http://schemas.microsoft.com/office/drawing/2010/main" xmlns="" w="9525">
                     <a:solidFill>
                       <a:srgbClr val="000000"/>
                     </a:solidFill>
@@ -14606,7 +14729,7 @@
               </a:ln>
               <a:extLst>
                 <a:ext uri="{91240B29-F687-4f45-9708-019B960494DF}">
-                  <a14:hiddenLine xmlns="" xmlns:a14="http://schemas.microsoft.com/office/drawing/2010/main" w="9525">
+                  <a14:hiddenLine xmlns:a14="http://schemas.microsoft.com/office/drawing/2010/main" xmlns="" w="9525">
                     <a:solidFill>
                       <a:srgbClr val="000000"/>
                     </a:solidFill>
@@ -14640,7 +14763,7 @@
               </a:ln>
               <a:extLst>
                 <a:ext uri="{91240B29-F687-4f45-9708-019B960494DF}">
-                  <a14:hiddenLine xmlns="" xmlns:a14="http://schemas.microsoft.com/office/drawing/2010/main" w="9525">
+                  <a14:hiddenLine xmlns:a14="http://schemas.microsoft.com/office/drawing/2010/main" xmlns="" w="9525">
                     <a:solidFill>
                       <a:srgbClr val="000000"/>
                     </a:solidFill>
@@ -15455,7 +15578,7 @@
             </a:ln>
             <a:extLst>
               <a:ext uri="{91240B29-F687-4f45-9708-019B960494DF}">
-                <a14:hiddenLine xmlns:a14="http://schemas.microsoft.com/office/drawing/2010/main" xmlns:p14="http://schemas.microsoft.com/office/powerpoint/2010/main" xmlns:a16="http://schemas.microsoft.com/office/drawing/2014/main" xmlns="" w="9525">
+                <a14:hiddenLine xmlns="" xmlns:a16="http://schemas.microsoft.com/office/drawing/2014/main" xmlns:p14="http://schemas.microsoft.com/office/powerpoint/2010/main" xmlns:a14="http://schemas.microsoft.com/office/drawing/2010/main" w="9525">
                   <a:solidFill>
                     <a:srgbClr val="000000"/>
                   </a:solidFill>
@@ -15560,7 +15683,7 @@
             </a:ln>
             <a:extLst>
               <a:ext uri="{91240B29-F687-4f45-9708-019B960494DF}">
-                <a14:hiddenLine xmlns:a14="http://schemas.microsoft.com/office/drawing/2010/main" xmlns:p14="http://schemas.microsoft.com/office/powerpoint/2010/main" xmlns:a16="http://schemas.microsoft.com/office/drawing/2014/main" xmlns="" w="9525">
+                <a14:hiddenLine xmlns="" xmlns:a16="http://schemas.microsoft.com/office/drawing/2014/main" xmlns:p14="http://schemas.microsoft.com/office/powerpoint/2010/main" xmlns:a14="http://schemas.microsoft.com/office/drawing/2010/main" w="9525">
                   <a:solidFill>
                     <a:srgbClr val="000000"/>
                   </a:solidFill>
@@ -15665,7 +15788,7 @@
             </a:ln>
             <a:extLst>
               <a:ext uri="{91240B29-F687-4f45-9708-019B960494DF}">
-                <a14:hiddenLine xmlns:a14="http://schemas.microsoft.com/office/drawing/2010/main" xmlns:p14="http://schemas.microsoft.com/office/powerpoint/2010/main" xmlns:a16="http://schemas.microsoft.com/office/drawing/2014/main" xmlns="" w="9525">
+                <a14:hiddenLine xmlns="" xmlns:a16="http://schemas.microsoft.com/office/drawing/2014/main" xmlns:p14="http://schemas.microsoft.com/office/powerpoint/2010/main" xmlns:a14="http://schemas.microsoft.com/office/drawing/2010/main" w="9525">
                   <a:solidFill>
                     <a:srgbClr val="000000"/>
                   </a:solidFill>
@@ -15714,7 +15837,7 @@
             </a:ln>
             <a:extLst>
               <a:ext uri="{91240B29-F687-4f45-9708-019B960494DF}">
-                <a14:hiddenLine xmlns:a14="http://schemas.microsoft.com/office/drawing/2010/main" xmlns:p14="http://schemas.microsoft.com/office/powerpoint/2010/main" xmlns:a16="http://schemas.microsoft.com/office/drawing/2014/main" xmlns="" w="9525">
+                <a14:hiddenLine xmlns="" xmlns:a16="http://schemas.microsoft.com/office/drawing/2014/main" xmlns:p14="http://schemas.microsoft.com/office/powerpoint/2010/main" xmlns:a14="http://schemas.microsoft.com/office/drawing/2010/main" w="9525">
                   <a:solidFill>
                     <a:srgbClr val="000000"/>
                   </a:solidFill>
@@ -15819,7 +15942,7 @@
             </a:ln>
             <a:extLst>
               <a:ext uri="{91240B29-F687-4f45-9708-019B960494DF}">
-                <a14:hiddenLine xmlns:a14="http://schemas.microsoft.com/office/drawing/2010/main" xmlns:p14="http://schemas.microsoft.com/office/powerpoint/2010/main" xmlns:a16="http://schemas.microsoft.com/office/drawing/2014/main" xmlns="" w="9525">
+                <a14:hiddenLine xmlns="" xmlns:a16="http://schemas.microsoft.com/office/drawing/2014/main" xmlns:p14="http://schemas.microsoft.com/office/powerpoint/2010/main" xmlns:a14="http://schemas.microsoft.com/office/drawing/2010/main" w="9525">
                   <a:solidFill>
                     <a:srgbClr val="000000"/>
                   </a:solidFill>
@@ -15896,7 +16019,7 @@
             </a:ln>
             <a:extLst>
               <a:ext uri="{91240B29-F687-4f45-9708-019B960494DF}">
-                <a14:hiddenLine xmlns:a14="http://schemas.microsoft.com/office/drawing/2010/main" xmlns:p14="http://schemas.microsoft.com/office/powerpoint/2010/main" xmlns:a16="http://schemas.microsoft.com/office/drawing/2014/main" xmlns="" w="9525">
+                <a14:hiddenLine xmlns="" xmlns:a16="http://schemas.microsoft.com/office/drawing/2014/main" xmlns:p14="http://schemas.microsoft.com/office/powerpoint/2010/main" xmlns:a14="http://schemas.microsoft.com/office/drawing/2010/main" w="9525">
                   <a:solidFill>
                     <a:srgbClr val="000000"/>
                   </a:solidFill>
@@ -15973,7 +16096,7 @@
             </a:ln>
             <a:extLst>
               <a:ext uri="{91240B29-F687-4f45-9708-019B960494DF}">
-                <a14:hiddenLine xmlns:a14="http://schemas.microsoft.com/office/drawing/2010/main" xmlns:p14="http://schemas.microsoft.com/office/powerpoint/2010/main" xmlns:a16="http://schemas.microsoft.com/office/drawing/2014/main" xmlns="" w="9525">
+                <a14:hiddenLine xmlns="" xmlns:a16="http://schemas.microsoft.com/office/drawing/2014/main" xmlns:p14="http://schemas.microsoft.com/office/powerpoint/2010/main" xmlns:a14="http://schemas.microsoft.com/office/drawing/2010/main" w="9525">
                   <a:solidFill>
                     <a:srgbClr val="000000"/>
                   </a:solidFill>
@@ -16078,7 +16201,7 @@
             </a:ln>
             <a:extLst>
               <a:ext uri="{91240B29-F687-4f45-9708-019B960494DF}">
-                <a14:hiddenLine xmlns:a14="http://schemas.microsoft.com/office/drawing/2010/main" xmlns:p14="http://schemas.microsoft.com/office/powerpoint/2010/main" xmlns:a16="http://schemas.microsoft.com/office/drawing/2014/main" xmlns="" w="9525">
+                <a14:hiddenLine xmlns="" xmlns:a16="http://schemas.microsoft.com/office/drawing/2014/main" xmlns:p14="http://schemas.microsoft.com/office/powerpoint/2010/main" xmlns:a14="http://schemas.microsoft.com/office/drawing/2010/main" w="9525">
                   <a:solidFill>
                     <a:srgbClr val="000000"/>
                   </a:solidFill>
@@ -16155,7 +16278,7 @@
             </a:ln>
             <a:extLst>
               <a:ext uri="{91240B29-F687-4f45-9708-019B960494DF}">
-                <a14:hiddenLine xmlns:a14="http://schemas.microsoft.com/office/drawing/2010/main" xmlns:p14="http://schemas.microsoft.com/office/powerpoint/2010/main" xmlns:a16="http://schemas.microsoft.com/office/drawing/2014/main" xmlns="" w="9525">
+                <a14:hiddenLine xmlns="" xmlns:a16="http://schemas.microsoft.com/office/drawing/2014/main" xmlns:p14="http://schemas.microsoft.com/office/powerpoint/2010/main" xmlns:a14="http://schemas.microsoft.com/office/drawing/2010/main" w="9525">
                   <a:solidFill>
                     <a:srgbClr val="000000"/>
                   </a:solidFill>
@@ -16232,7 +16355,7 @@
             </a:ln>
             <a:extLst>
               <a:ext uri="{91240B29-F687-4f45-9708-019B960494DF}">
-                <a14:hiddenLine xmlns:a14="http://schemas.microsoft.com/office/drawing/2010/main" xmlns:p14="http://schemas.microsoft.com/office/powerpoint/2010/main" xmlns:a16="http://schemas.microsoft.com/office/drawing/2014/main" xmlns="" w="9525">
+                <a14:hiddenLine xmlns="" xmlns:a16="http://schemas.microsoft.com/office/drawing/2014/main" xmlns:p14="http://schemas.microsoft.com/office/powerpoint/2010/main" xmlns:a14="http://schemas.microsoft.com/office/drawing/2010/main" w="9525">
                   <a:solidFill>
                     <a:srgbClr val="000000"/>
                   </a:solidFill>
@@ -16337,7 +16460,7 @@
             </a:ln>
             <a:extLst>
               <a:ext uri="{91240B29-F687-4f45-9708-019B960494DF}">
-                <a14:hiddenLine xmlns:a14="http://schemas.microsoft.com/office/drawing/2010/main" xmlns:p14="http://schemas.microsoft.com/office/powerpoint/2010/main" xmlns:a16="http://schemas.microsoft.com/office/drawing/2014/main" xmlns="" w="9525">
+                <a14:hiddenLine xmlns="" xmlns:a16="http://schemas.microsoft.com/office/drawing/2014/main" xmlns:p14="http://schemas.microsoft.com/office/powerpoint/2010/main" xmlns:a14="http://schemas.microsoft.com/office/drawing/2010/main" w="9525">
                   <a:solidFill>
                     <a:srgbClr val="000000"/>
                   </a:solidFill>
@@ -16442,7 +16565,7 @@
             </a:ln>
             <a:extLst>
               <a:ext uri="{91240B29-F687-4f45-9708-019B960494DF}">
-                <a14:hiddenLine xmlns:a14="http://schemas.microsoft.com/office/drawing/2010/main" xmlns:p14="http://schemas.microsoft.com/office/powerpoint/2010/main" xmlns:a16="http://schemas.microsoft.com/office/drawing/2014/main" xmlns="" w="9525">
+                <a14:hiddenLine xmlns="" xmlns:a16="http://schemas.microsoft.com/office/drawing/2014/main" xmlns:p14="http://schemas.microsoft.com/office/powerpoint/2010/main" xmlns:a14="http://schemas.microsoft.com/office/drawing/2010/main" w="9525">
                   <a:solidFill>
                     <a:srgbClr val="000000"/>
                   </a:solidFill>
@@ -16519,7 +16642,7 @@
             </a:ln>
             <a:extLst>
               <a:ext uri="{91240B29-F687-4f45-9708-019B960494DF}">
-                <a14:hiddenLine xmlns:a14="http://schemas.microsoft.com/office/drawing/2010/main" xmlns:p14="http://schemas.microsoft.com/office/powerpoint/2010/main" xmlns:a16="http://schemas.microsoft.com/office/drawing/2014/main" xmlns="" w="9525">
+                <a14:hiddenLine xmlns="" xmlns:a16="http://schemas.microsoft.com/office/drawing/2014/main" xmlns:p14="http://schemas.microsoft.com/office/powerpoint/2010/main" xmlns:a14="http://schemas.microsoft.com/office/drawing/2010/main" w="9525">
                   <a:solidFill>
                     <a:srgbClr val="000000"/>
                   </a:solidFill>
@@ -16644,7 +16767,7 @@
             </a:ln>
             <a:extLst>
               <a:ext uri="{91240B29-F687-4f45-9708-019B960494DF}">
-                <a14:hiddenLine xmlns:a14="http://schemas.microsoft.com/office/drawing/2010/main" xmlns:p14="http://schemas.microsoft.com/office/powerpoint/2010/main" xmlns:a16="http://schemas.microsoft.com/office/drawing/2014/main" xmlns="" w="9525">
+                <a14:hiddenLine xmlns="" xmlns:a16="http://schemas.microsoft.com/office/drawing/2014/main" xmlns:p14="http://schemas.microsoft.com/office/powerpoint/2010/main" xmlns:a14="http://schemas.microsoft.com/office/drawing/2010/main" w="9525">
                   <a:solidFill>
                     <a:srgbClr val="000000"/>
                   </a:solidFill>
@@ -16721,7 +16844,7 @@
             </a:ln>
             <a:extLst>
               <a:ext uri="{91240B29-F687-4f45-9708-019B960494DF}">
-                <a14:hiddenLine xmlns:a14="http://schemas.microsoft.com/office/drawing/2010/main" xmlns:p14="http://schemas.microsoft.com/office/powerpoint/2010/main" xmlns:a16="http://schemas.microsoft.com/office/drawing/2014/main" xmlns="" w="9525">
+                <a14:hiddenLine xmlns="" xmlns:a16="http://schemas.microsoft.com/office/drawing/2014/main" xmlns:p14="http://schemas.microsoft.com/office/powerpoint/2010/main" xmlns:a14="http://schemas.microsoft.com/office/drawing/2010/main" w="9525">
                   <a:solidFill>
                     <a:srgbClr val="000000"/>
                   </a:solidFill>
@@ -16826,7 +16949,7 @@
             </a:ln>
             <a:extLst>
               <a:ext uri="{91240B29-F687-4f45-9708-019B960494DF}">
-                <a14:hiddenLine xmlns:a14="http://schemas.microsoft.com/office/drawing/2010/main" xmlns:p14="http://schemas.microsoft.com/office/powerpoint/2010/main" xmlns:a16="http://schemas.microsoft.com/office/drawing/2014/main" xmlns="" w="9525">
+                <a14:hiddenLine xmlns="" xmlns:a16="http://schemas.microsoft.com/office/drawing/2014/main" xmlns:p14="http://schemas.microsoft.com/office/powerpoint/2010/main" xmlns:a14="http://schemas.microsoft.com/office/drawing/2010/main" w="9525">
                   <a:solidFill>
                     <a:srgbClr val="000000"/>
                   </a:solidFill>
@@ -16931,7 +17054,7 @@
             </a:ln>
             <a:extLst>
               <a:ext uri="{91240B29-F687-4f45-9708-019B960494DF}">
-                <a14:hiddenLine xmlns:a14="http://schemas.microsoft.com/office/drawing/2010/main" xmlns:p14="http://schemas.microsoft.com/office/powerpoint/2010/main" xmlns:a16="http://schemas.microsoft.com/office/drawing/2014/main" xmlns="" w="9525">
+                <a14:hiddenLine xmlns="" xmlns:a16="http://schemas.microsoft.com/office/drawing/2014/main" xmlns:p14="http://schemas.microsoft.com/office/powerpoint/2010/main" xmlns:a14="http://schemas.microsoft.com/office/drawing/2010/main" w="9525">
                   <a:solidFill>
                     <a:srgbClr val="000000"/>
                   </a:solidFill>
@@ -17008,7 +17131,7 @@
             </a:ln>
             <a:extLst>
               <a:ext uri="{91240B29-F687-4f45-9708-019B960494DF}">
-                <a14:hiddenLine xmlns:a14="http://schemas.microsoft.com/office/drawing/2010/main" xmlns:p14="http://schemas.microsoft.com/office/powerpoint/2010/main" xmlns:a16="http://schemas.microsoft.com/office/drawing/2014/main" xmlns="" w="9525">
+                <a14:hiddenLine xmlns="" xmlns:a16="http://schemas.microsoft.com/office/drawing/2014/main" xmlns:p14="http://schemas.microsoft.com/office/powerpoint/2010/main" xmlns:a14="http://schemas.microsoft.com/office/drawing/2010/main" w="9525">
                   <a:solidFill>
                     <a:srgbClr val="000000"/>
                   </a:solidFill>
@@ -17113,7 +17236,7 @@
             </a:ln>
             <a:extLst>
               <a:ext uri="{91240B29-F687-4f45-9708-019B960494DF}">
-                <a14:hiddenLine xmlns:a14="http://schemas.microsoft.com/office/drawing/2010/main" xmlns:p14="http://schemas.microsoft.com/office/powerpoint/2010/main" xmlns:a16="http://schemas.microsoft.com/office/drawing/2014/main" xmlns="" w="9525">
+                <a14:hiddenLine xmlns="" xmlns:a16="http://schemas.microsoft.com/office/drawing/2014/main" xmlns:p14="http://schemas.microsoft.com/office/powerpoint/2010/main" xmlns:a14="http://schemas.microsoft.com/office/drawing/2010/main" w="9525">
                   <a:solidFill>
                     <a:srgbClr val="000000"/>
                   </a:solidFill>
@@ -17218,7 +17341,7 @@
             </a:ln>
             <a:extLst>
               <a:ext uri="{91240B29-F687-4f45-9708-019B960494DF}">
-                <a14:hiddenLine xmlns:a14="http://schemas.microsoft.com/office/drawing/2010/main" xmlns:p14="http://schemas.microsoft.com/office/powerpoint/2010/main" xmlns:a16="http://schemas.microsoft.com/office/drawing/2014/main" xmlns="" w="9525">
+                <a14:hiddenLine xmlns="" xmlns:a16="http://schemas.microsoft.com/office/drawing/2014/main" xmlns:p14="http://schemas.microsoft.com/office/powerpoint/2010/main" xmlns:a14="http://schemas.microsoft.com/office/drawing/2010/main" w="9525">
                   <a:solidFill>
                     <a:srgbClr val="000000"/>
                   </a:solidFill>
@@ -17289,7 +17412,7 @@
             </a:ln>
             <a:extLst>
               <a:ext uri="{91240B29-F687-4f45-9708-019B960494DF}">
-                <a14:hiddenLine xmlns:a14="http://schemas.microsoft.com/office/drawing/2010/main" xmlns:p14="http://schemas.microsoft.com/office/powerpoint/2010/main" xmlns:a16="http://schemas.microsoft.com/office/drawing/2014/main" xmlns="" w="9525">
+                <a14:hiddenLine xmlns="" xmlns:a16="http://schemas.microsoft.com/office/drawing/2014/main" xmlns:p14="http://schemas.microsoft.com/office/powerpoint/2010/main" xmlns:a14="http://schemas.microsoft.com/office/drawing/2010/main" w="9525">
                   <a:solidFill>
                     <a:srgbClr val="000000"/>
                   </a:solidFill>
@@ -17394,7 +17517,7 @@
             </a:ln>
             <a:extLst>
               <a:ext uri="{91240B29-F687-4f45-9708-019B960494DF}">
-                <a14:hiddenLine xmlns:a14="http://schemas.microsoft.com/office/drawing/2010/main" xmlns:p14="http://schemas.microsoft.com/office/powerpoint/2010/main" xmlns:a16="http://schemas.microsoft.com/office/drawing/2014/main" xmlns="" w="9525">
+                <a14:hiddenLine xmlns="" xmlns:a16="http://schemas.microsoft.com/office/drawing/2014/main" xmlns:p14="http://schemas.microsoft.com/office/powerpoint/2010/main" xmlns:a14="http://schemas.microsoft.com/office/drawing/2010/main" w="9525">
                   <a:solidFill>
                     <a:srgbClr val="000000"/>
                   </a:solidFill>
@@ -17465,7 +17588,7 @@
             </a:ln>
             <a:extLst>
               <a:ext uri="{91240B29-F687-4f45-9708-019B960494DF}">
-                <a14:hiddenLine xmlns:a14="http://schemas.microsoft.com/office/drawing/2010/main" xmlns:p14="http://schemas.microsoft.com/office/powerpoint/2010/main" xmlns:a16="http://schemas.microsoft.com/office/drawing/2014/main" xmlns="" w="9525">
+                <a14:hiddenLine xmlns="" xmlns:a16="http://schemas.microsoft.com/office/drawing/2014/main" xmlns:p14="http://schemas.microsoft.com/office/powerpoint/2010/main" xmlns:a14="http://schemas.microsoft.com/office/drawing/2010/main" w="9525">
                   <a:solidFill>
                     <a:srgbClr val="000000"/>
                   </a:solidFill>
@@ -17570,7 +17693,7 @@
             </a:ln>
             <a:extLst>
               <a:ext uri="{91240B29-F687-4f45-9708-019B960494DF}">
-                <a14:hiddenLine xmlns:a14="http://schemas.microsoft.com/office/drawing/2010/main" xmlns:p14="http://schemas.microsoft.com/office/powerpoint/2010/main" xmlns:a16="http://schemas.microsoft.com/office/drawing/2014/main" xmlns="" w="9525">
+                <a14:hiddenLine xmlns="" xmlns:a16="http://schemas.microsoft.com/office/drawing/2014/main" xmlns:p14="http://schemas.microsoft.com/office/powerpoint/2010/main" xmlns:a14="http://schemas.microsoft.com/office/drawing/2010/main" w="9525">
                   <a:solidFill>
                     <a:srgbClr val="000000"/>
                   </a:solidFill>
@@ -17653,7 +17776,7 @@
             </a:ln>
             <a:extLst>
               <a:ext uri="{91240B29-F687-4f45-9708-019B960494DF}">
-                <a14:hiddenLine xmlns:a14="http://schemas.microsoft.com/office/drawing/2010/main" xmlns:p14="http://schemas.microsoft.com/office/powerpoint/2010/main" xmlns:a16="http://schemas.microsoft.com/office/drawing/2014/main" xmlns="" w="9525">
+                <a14:hiddenLine xmlns="" xmlns:a16="http://schemas.microsoft.com/office/drawing/2014/main" xmlns:p14="http://schemas.microsoft.com/office/powerpoint/2010/main" xmlns:a14="http://schemas.microsoft.com/office/drawing/2010/main" w="9525">
                   <a:solidFill>
                     <a:srgbClr val="000000"/>
                   </a:solidFill>
@@ -17758,7 +17881,7 @@
             </a:ln>
             <a:extLst>
               <a:ext uri="{91240B29-F687-4f45-9708-019B960494DF}">
-                <a14:hiddenLine xmlns:a14="http://schemas.microsoft.com/office/drawing/2010/main" xmlns:p14="http://schemas.microsoft.com/office/powerpoint/2010/main" xmlns:a16="http://schemas.microsoft.com/office/drawing/2014/main" xmlns="" w="9525">
+                <a14:hiddenLine xmlns="" xmlns:a16="http://schemas.microsoft.com/office/drawing/2014/main" xmlns:p14="http://schemas.microsoft.com/office/powerpoint/2010/main" xmlns:a14="http://schemas.microsoft.com/office/drawing/2010/main" w="9525">
                   <a:solidFill>
                     <a:srgbClr val="000000"/>
                   </a:solidFill>
@@ -17841,7 +17964,7 @@
             </a:ln>
             <a:extLst>
               <a:ext uri="{91240B29-F687-4f45-9708-019B960494DF}">
-                <a14:hiddenLine xmlns:a14="http://schemas.microsoft.com/office/drawing/2010/main" xmlns:p14="http://schemas.microsoft.com/office/powerpoint/2010/main" xmlns:a16="http://schemas.microsoft.com/office/drawing/2014/main" xmlns="" w="9525">
+                <a14:hiddenLine xmlns="" xmlns:a16="http://schemas.microsoft.com/office/drawing/2014/main" xmlns:p14="http://schemas.microsoft.com/office/powerpoint/2010/main" xmlns:a14="http://schemas.microsoft.com/office/drawing/2010/main" w="9525">
                   <a:solidFill>
                     <a:srgbClr val="000000"/>
                   </a:solidFill>
@@ -17946,7 +18069,7 @@
             </a:ln>
             <a:extLst>
               <a:ext uri="{91240B29-F687-4f45-9708-019B960494DF}">
-                <a14:hiddenLine xmlns:a14="http://schemas.microsoft.com/office/drawing/2010/main" xmlns:p14="http://schemas.microsoft.com/office/powerpoint/2010/main" xmlns:a16="http://schemas.microsoft.com/office/drawing/2014/main" xmlns="" w="9525">
+                <a14:hiddenLine xmlns="" xmlns:a16="http://schemas.microsoft.com/office/drawing/2014/main" xmlns:p14="http://schemas.microsoft.com/office/powerpoint/2010/main" xmlns:a14="http://schemas.microsoft.com/office/drawing/2010/main" w="9525">
                   <a:solidFill>
                     <a:srgbClr val="000000"/>
                   </a:solidFill>
@@ -17995,7 +18118,7 @@
             </a:ln>
             <a:extLst>
               <a:ext uri="{91240B29-F687-4f45-9708-019B960494DF}">
-                <a14:hiddenLine xmlns:a14="http://schemas.microsoft.com/office/drawing/2010/main" xmlns:p14="http://schemas.microsoft.com/office/powerpoint/2010/main" xmlns:a16="http://schemas.microsoft.com/office/drawing/2014/main" xmlns="" w="9525">
+                <a14:hiddenLine xmlns="" xmlns:a16="http://schemas.microsoft.com/office/drawing/2014/main" xmlns:p14="http://schemas.microsoft.com/office/powerpoint/2010/main" xmlns:a14="http://schemas.microsoft.com/office/drawing/2010/main" w="9525">
                   <a:solidFill>
                     <a:srgbClr val="000000"/>
                   </a:solidFill>
@@ -18100,7 +18223,7 @@
             </a:ln>
             <a:extLst>
               <a:ext uri="{91240B29-F687-4f45-9708-019B960494DF}">
-                <a14:hiddenLine xmlns:a14="http://schemas.microsoft.com/office/drawing/2010/main" xmlns:p14="http://schemas.microsoft.com/office/powerpoint/2010/main" xmlns:a16="http://schemas.microsoft.com/office/drawing/2014/main" xmlns="" w="9525">
+                <a14:hiddenLine xmlns="" xmlns:a16="http://schemas.microsoft.com/office/drawing/2014/main" xmlns:p14="http://schemas.microsoft.com/office/powerpoint/2010/main" xmlns:a14="http://schemas.microsoft.com/office/drawing/2010/main" w="9525">
                   <a:solidFill>
                     <a:srgbClr val="000000"/>
                   </a:solidFill>
@@ -18177,7 +18300,7 @@
             </a:ln>
             <a:extLst>
               <a:ext uri="{91240B29-F687-4f45-9708-019B960494DF}">
-                <a14:hiddenLine xmlns:a14="http://schemas.microsoft.com/office/drawing/2010/main" xmlns:p14="http://schemas.microsoft.com/office/powerpoint/2010/main" xmlns:a16="http://schemas.microsoft.com/office/drawing/2014/main" xmlns="" w="9525">
+                <a14:hiddenLine xmlns="" xmlns:a16="http://schemas.microsoft.com/office/drawing/2014/main" xmlns:p14="http://schemas.microsoft.com/office/powerpoint/2010/main" xmlns:a14="http://schemas.microsoft.com/office/drawing/2010/main" w="9525">
                   <a:solidFill>
                     <a:srgbClr val="000000"/>
                   </a:solidFill>
@@ -18254,7 +18377,7 @@
             </a:ln>
             <a:extLst>
               <a:ext uri="{91240B29-F687-4f45-9708-019B960494DF}">
-                <a14:hiddenLine xmlns:a14="http://schemas.microsoft.com/office/drawing/2010/main" xmlns:p14="http://schemas.microsoft.com/office/powerpoint/2010/main" xmlns:a16="http://schemas.microsoft.com/office/drawing/2014/main" xmlns="" w="9525">
+                <a14:hiddenLine xmlns="" xmlns:a16="http://schemas.microsoft.com/office/drawing/2014/main" xmlns:p14="http://schemas.microsoft.com/office/powerpoint/2010/main" xmlns:a14="http://schemas.microsoft.com/office/drawing/2010/main" w="9525">
                   <a:solidFill>
                     <a:srgbClr val="000000"/>
                   </a:solidFill>
@@ -18359,7 +18482,7 @@
             </a:ln>
             <a:extLst>
               <a:ext uri="{91240B29-F687-4f45-9708-019B960494DF}">
-                <a14:hiddenLine xmlns:a14="http://schemas.microsoft.com/office/drawing/2010/main" xmlns:p14="http://schemas.microsoft.com/office/powerpoint/2010/main" xmlns:a16="http://schemas.microsoft.com/office/drawing/2014/main" xmlns="" w="9525">
+                <a14:hiddenLine xmlns="" xmlns:a16="http://schemas.microsoft.com/office/drawing/2014/main" xmlns:p14="http://schemas.microsoft.com/office/powerpoint/2010/main" xmlns:a14="http://schemas.microsoft.com/office/drawing/2010/main" w="9525">
                   <a:solidFill>
                     <a:srgbClr val="000000"/>
                   </a:solidFill>
@@ -18442,7 +18565,7 @@
             </a:ln>
             <a:extLst>
               <a:ext uri="{91240B29-F687-4f45-9708-019B960494DF}">
-                <a14:hiddenLine xmlns:a14="http://schemas.microsoft.com/office/drawing/2010/main" xmlns:p14="http://schemas.microsoft.com/office/powerpoint/2010/main" xmlns:a16="http://schemas.microsoft.com/office/drawing/2014/main" xmlns="" w="9525">
+                <a14:hiddenLine xmlns="" xmlns:a16="http://schemas.microsoft.com/office/drawing/2014/main" xmlns:p14="http://schemas.microsoft.com/office/powerpoint/2010/main" xmlns:a14="http://schemas.microsoft.com/office/drawing/2010/main" w="9525">
                   <a:solidFill>
                     <a:srgbClr val="000000"/>
                   </a:solidFill>
@@ -18519,7 +18642,7 @@
             </a:ln>
             <a:extLst>
               <a:ext uri="{91240B29-F687-4f45-9708-019B960494DF}">
-                <a14:hiddenLine xmlns:a14="http://schemas.microsoft.com/office/drawing/2010/main" xmlns:p14="http://schemas.microsoft.com/office/powerpoint/2010/main" xmlns:a16="http://schemas.microsoft.com/office/drawing/2014/main" xmlns="" w="9525">
+                <a14:hiddenLine xmlns="" xmlns:a16="http://schemas.microsoft.com/office/drawing/2014/main" xmlns:p14="http://schemas.microsoft.com/office/powerpoint/2010/main" xmlns:a14="http://schemas.microsoft.com/office/drawing/2010/main" w="9525">
                   <a:solidFill>
                     <a:srgbClr val="000000"/>
                   </a:solidFill>
@@ -18624,7 +18747,7 @@
             </a:ln>
             <a:extLst>
               <a:ext uri="{91240B29-F687-4f45-9708-019B960494DF}">
-                <a14:hiddenLine xmlns:a14="http://schemas.microsoft.com/office/drawing/2010/main" xmlns:p14="http://schemas.microsoft.com/office/powerpoint/2010/main" xmlns:a16="http://schemas.microsoft.com/office/drawing/2014/main" xmlns="" w="9525">
+                <a14:hiddenLine xmlns="" xmlns:a16="http://schemas.microsoft.com/office/drawing/2014/main" xmlns:p14="http://schemas.microsoft.com/office/powerpoint/2010/main" xmlns:a14="http://schemas.microsoft.com/office/drawing/2010/main" w="9525">
                   <a:solidFill>
                     <a:srgbClr val="000000"/>
                   </a:solidFill>
@@ -18701,7 +18824,7 @@
             </a:ln>
             <a:extLst>
               <a:ext uri="{91240B29-F687-4f45-9708-019B960494DF}">
-                <a14:hiddenLine xmlns:a14="http://schemas.microsoft.com/office/drawing/2010/main" xmlns:p14="http://schemas.microsoft.com/office/powerpoint/2010/main" xmlns:a16="http://schemas.microsoft.com/office/drawing/2014/main" xmlns="" w="9525">
+                <a14:hiddenLine xmlns="" xmlns:a16="http://schemas.microsoft.com/office/drawing/2014/main" xmlns:p14="http://schemas.microsoft.com/office/powerpoint/2010/main" xmlns:a14="http://schemas.microsoft.com/office/drawing/2010/main" w="9525">
                   <a:solidFill>
                     <a:srgbClr val="000000"/>
                   </a:solidFill>
@@ -18806,7 +18929,7 @@
             </a:ln>
             <a:extLst>
               <a:ext uri="{91240B29-F687-4f45-9708-019B960494DF}">
-                <a14:hiddenLine xmlns:a14="http://schemas.microsoft.com/office/drawing/2010/main" xmlns:p14="http://schemas.microsoft.com/office/powerpoint/2010/main" xmlns:a16="http://schemas.microsoft.com/office/drawing/2014/main" xmlns="" w="9525">
+                <a14:hiddenLine xmlns="" xmlns:a16="http://schemas.microsoft.com/office/drawing/2014/main" xmlns:p14="http://schemas.microsoft.com/office/powerpoint/2010/main" xmlns:a14="http://schemas.microsoft.com/office/drawing/2010/main" w="9525">
                   <a:solidFill>
                     <a:srgbClr val="000000"/>
                   </a:solidFill>
@@ -18883,7 +19006,7 @@
             </a:ln>
             <a:extLst>
               <a:ext uri="{91240B29-F687-4f45-9708-019B960494DF}">
-                <a14:hiddenLine xmlns:a14="http://schemas.microsoft.com/office/drawing/2010/main" xmlns:p14="http://schemas.microsoft.com/office/powerpoint/2010/main" xmlns:a16="http://schemas.microsoft.com/office/drawing/2014/main" xmlns="" w="9525">
+                <a14:hiddenLine xmlns="" xmlns:a16="http://schemas.microsoft.com/office/drawing/2014/main" xmlns:p14="http://schemas.microsoft.com/office/powerpoint/2010/main" xmlns:a14="http://schemas.microsoft.com/office/drawing/2010/main" w="9525">
                   <a:solidFill>
                     <a:srgbClr val="000000"/>
                   </a:solidFill>
@@ -18988,7 +19111,7 @@
             </a:ln>
             <a:extLst>
               <a:ext uri="{91240B29-F687-4f45-9708-019B960494DF}">
-                <a14:hiddenLine xmlns:a14="http://schemas.microsoft.com/office/drawing/2010/main" xmlns:p14="http://schemas.microsoft.com/office/powerpoint/2010/main" xmlns:a16="http://schemas.microsoft.com/office/drawing/2014/main" xmlns="" w="9525">
+                <a14:hiddenLine xmlns="" xmlns:a16="http://schemas.microsoft.com/office/drawing/2014/main" xmlns:p14="http://schemas.microsoft.com/office/powerpoint/2010/main" xmlns:a14="http://schemas.microsoft.com/office/drawing/2010/main" w="9525">
                   <a:solidFill>
                     <a:srgbClr val="000000"/>
                   </a:solidFill>
@@ -19037,7 +19160,7 @@
             </a:ln>
             <a:extLst>
               <a:ext uri="{91240B29-F687-4f45-9708-019B960494DF}">
-                <a14:hiddenLine xmlns:a14="http://schemas.microsoft.com/office/drawing/2010/main" xmlns:p14="http://schemas.microsoft.com/office/powerpoint/2010/main" xmlns:a16="http://schemas.microsoft.com/office/drawing/2014/main" xmlns="" w="9525">
+                <a14:hiddenLine xmlns="" xmlns:a16="http://schemas.microsoft.com/office/drawing/2014/main" xmlns:p14="http://schemas.microsoft.com/office/powerpoint/2010/main" xmlns:a14="http://schemas.microsoft.com/office/drawing/2010/main" w="9525">
                   <a:solidFill>
                     <a:srgbClr val="000000"/>
                   </a:solidFill>
@@ -19117,7 +19240,7 @@
             </a:ln>
             <a:extLst>
               <a:ext uri="{91240B29-F687-4f45-9708-019B960494DF}">
-                <a14:hiddenLine xmlns:a14="http://schemas.microsoft.com/office/drawing/2010/main" xmlns:p14="http://schemas.microsoft.com/office/powerpoint/2010/main" xmlns:a16="http://schemas.microsoft.com/office/drawing/2014/main" xmlns="" w="9525">
+                <a14:hiddenLine xmlns="" xmlns:a16="http://schemas.microsoft.com/office/drawing/2014/main" xmlns:p14="http://schemas.microsoft.com/office/powerpoint/2010/main" xmlns:a14="http://schemas.microsoft.com/office/drawing/2010/main" w="9525">
                   <a:solidFill>
                     <a:srgbClr val="000000"/>
                   </a:solidFill>
@@ -19222,7 +19345,7 @@
             </a:ln>
             <a:extLst>
               <a:ext uri="{91240B29-F687-4f45-9708-019B960494DF}">
-                <a14:hiddenLine xmlns:a14="http://schemas.microsoft.com/office/drawing/2010/main" xmlns:p14="http://schemas.microsoft.com/office/powerpoint/2010/main" xmlns:a16="http://schemas.microsoft.com/office/drawing/2014/main" xmlns="" w="9525">
+                <a14:hiddenLine xmlns="" xmlns:a16="http://schemas.microsoft.com/office/drawing/2014/main" xmlns:p14="http://schemas.microsoft.com/office/powerpoint/2010/main" xmlns:a14="http://schemas.microsoft.com/office/drawing/2010/main" w="9525">
                   <a:solidFill>
                     <a:srgbClr val="000000"/>
                   </a:solidFill>
@@ -19299,7 +19422,7 @@
             </a:ln>
             <a:extLst>
               <a:ext uri="{91240B29-F687-4f45-9708-019B960494DF}">
-                <a14:hiddenLine xmlns:a14="http://schemas.microsoft.com/office/drawing/2010/main" xmlns:p14="http://schemas.microsoft.com/office/powerpoint/2010/main" xmlns:a16="http://schemas.microsoft.com/office/drawing/2014/main" xmlns="" w="9525">
+                <a14:hiddenLine xmlns="" xmlns:a16="http://schemas.microsoft.com/office/drawing/2014/main" xmlns:p14="http://schemas.microsoft.com/office/powerpoint/2010/main" xmlns:a14="http://schemas.microsoft.com/office/drawing/2010/main" w="9525">
                   <a:solidFill>
                     <a:srgbClr val="000000"/>
                   </a:solidFill>
@@ -19404,7 +19527,7 @@
             </a:ln>
             <a:extLst>
               <a:ext uri="{91240B29-F687-4f45-9708-019B960494DF}">
-                <a14:hiddenLine xmlns:a14="http://schemas.microsoft.com/office/drawing/2010/main" xmlns:p14="http://schemas.microsoft.com/office/powerpoint/2010/main" xmlns:a16="http://schemas.microsoft.com/office/drawing/2014/main" xmlns="" w="9525">
+                <a14:hiddenLine xmlns="" xmlns:a16="http://schemas.microsoft.com/office/drawing/2014/main" xmlns:p14="http://schemas.microsoft.com/office/powerpoint/2010/main" xmlns:a14="http://schemas.microsoft.com/office/drawing/2010/main" w="9525">
                   <a:solidFill>
                     <a:srgbClr val="000000"/>
                   </a:solidFill>
@@ -19509,7 +19632,7 @@
             </a:ln>
             <a:extLst>
               <a:ext uri="{91240B29-F687-4f45-9708-019B960494DF}">
-                <a14:hiddenLine xmlns:a14="http://schemas.microsoft.com/office/drawing/2010/main" xmlns:p14="http://schemas.microsoft.com/office/powerpoint/2010/main" xmlns:a16="http://schemas.microsoft.com/office/drawing/2014/main" xmlns="" w="9525">
+                <a14:hiddenLine xmlns="" xmlns:a16="http://schemas.microsoft.com/office/drawing/2014/main" xmlns:p14="http://schemas.microsoft.com/office/powerpoint/2010/main" xmlns:a14="http://schemas.microsoft.com/office/drawing/2010/main" w="9525">
                   <a:solidFill>
                     <a:srgbClr val="000000"/>
                   </a:solidFill>
@@ -19589,7 +19712,7 @@
             </a:ln>
             <a:extLst>
               <a:ext uri="{91240B29-F687-4f45-9708-019B960494DF}">
-                <a14:hiddenLine xmlns:a14="http://schemas.microsoft.com/office/drawing/2010/main" xmlns:p14="http://schemas.microsoft.com/office/powerpoint/2010/main" xmlns:a16="http://schemas.microsoft.com/office/drawing/2014/main" xmlns="" w="9525">
+                <a14:hiddenLine xmlns="" xmlns:a16="http://schemas.microsoft.com/office/drawing/2014/main" xmlns:p14="http://schemas.microsoft.com/office/powerpoint/2010/main" xmlns:a14="http://schemas.microsoft.com/office/drawing/2010/main" w="9525">
                   <a:solidFill>
                     <a:srgbClr val="000000"/>
                   </a:solidFill>
@@ -19666,7 +19789,7 @@
             </a:ln>
             <a:extLst>
               <a:ext uri="{91240B29-F687-4f45-9708-019B960494DF}">
-                <a14:hiddenLine xmlns:a14="http://schemas.microsoft.com/office/drawing/2010/main" xmlns:p14="http://schemas.microsoft.com/office/powerpoint/2010/main" xmlns:a16="http://schemas.microsoft.com/office/drawing/2014/main" xmlns="" w="9525">
+                <a14:hiddenLine xmlns="" xmlns:a16="http://schemas.microsoft.com/office/drawing/2014/main" xmlns:p14="http://schemas.microsoft.com/office/powerpoint/2010/main" xmlns:a14="http://schemas.microsoft.com/office/drawing/2010/main" w="9525">
                   <a:solidFill>
                     <a:srgbClr val="000000"/>
                   </a:solidFill>
@@ -19771,7 +19894,7 @@
             </a:ln>
             <a:extLst>
               <a:ext uri="{91240B29-F687-4f45-9708-019B960494DF}">
-                <a14:hiddenLine xmlns:a14="http://schemas.microsoft.com/office/drawing/2010/main" xmlns:p14="http://schemas.microsoft.com/office/powerpoint/2010/main" xmlns:a16="http://schemas.microsoft.com/office/drawing/2014/main" xmlns="" w="9525">
+                <a14:hiddenLine xmlns="" xmlns:a16="http://schemas.microsoft.com/office/drawing/2014/main" xmlns:p14="http://schemas.microsoft.com/office/powerpoint/2010/main" xmlns:a14="http://schemas.microsoft.com/office/drawing/2010/main" w="9525">
                   <a:solidFill>
                     <a:srgbClr val="000000"/>
                   </a:solidFill>
@@ -19876,7 +19999,7 @@
             </a:ln>
             <a:extLst>
               <a:ext uri="{91240B29-F687-4f45-9708-019B960494DF}">
-                <a14:hiddenLine xmlns:a14="http://schemas.microsoft.com/office/drawing/2010/main" xmlns:p14="http://schemas.microsoft.com/office/powerpoint/2010/main" xmlns:a16="http://schemas.microsoft.com/office/drawing/2014/main" xmlns="" w="9525">
+                <a14:hiddenLine xmlns="" xmlns:a16="http://schemas.microsoft.com/office/drawing/2014/main" xmlns:p14="http://schemas.microsoft.com/office/powerpoint/2010/main" xmlns:a14="http://schemas.microsoft.com/office/drawing/2010/main" w="9525">
                   <a:solidFill>
                     <a:srgbClr val="000000"/>
                   </a:solidFill>
@@ -19953,7 +20076,7 @@
             </a:ln>
             <a:extLst>
               <a:ext uri="{91240B29-F687-4f45-9708-019B960494DF}">
-                <a14:hiddenLine xmlns:a14="http://schemas.microsoft.com/office/drawing/2010/main" xmlns:p14="http://schemas.microsoft.com/office/powerpoint/2010/main" xmlns:a16="http://schemas.microsoft.com/office/drawing/2014/main" xmlns="" w="9525">
+                <a14:hiddenLine xmlns="" xmlns:a16="http://schemas.microsoft.com/office/drawing/2014/main" xmlns:p14="http://schemas.microsoft.com/office/powerpoint/2010/main" xmlns:a14="http://schemas.microsoft.com/office/drawing/2010/main" w="9525">
                   <a:solidFill>
                     <a:srgbClr val="000000"/>
                   </a:solidFill>
@@ -20088,7 +20211,7 @@
             </a:ln>
             <a:extLst>
               <a:ext uri="{91240B29-F687-4f45-9708-019B960494DF}">
-                <a14:hiddenLine xmlns:a14="http://schemas.microsoft.com/office/drawing/2010/main" xmlns:p14="http://schemas.microsoft.com/office/powerpoint/2010/main" xmlns:a16="http://schemas.microsoft.com/office/drawing/2014/main" xmlns="" w="9525">
+                <a14:hiddenLine xmlns="" xmlns:a16="http://schemas.microsoft.com/office/drawing/2014/main" xmlns:p14="http://schemas.microsoft.com/office/powerpoint/2010/main" xmlns:a14="http://schemas.microsoft.com/office/drawing/2010/main" w="9525">
                   <a:solidFill>
                     <a:srgbClr val="000000"/>
                   </a:solidFill>
@@ -20171,7 +20294,7 @@
             </a:ln>
             <a:extLst>
               <a:ext uri="{91240B29-F687-4f45-9708-019B960494DF}">
-                <a14:hiddenLine xmlns:a14="http://schemas.microsoft.com/office/drawing/2010/main" xmlns:p14="http://schemas.microsoft.com/office/powerpoint/2010/main" xmlns:a16="http://schemas.microsoft.com/office/drawing/2014/main" xmlns="" w="9525">
+                <a14:hiddenLine xmlns="" xmlns:a16="http://schemas.microsoft.com/office/drawing/2014/main" xmlns:p14="http://schemas.microsoft.com/office/powerpoint/2010/main" xmlns:a14="http://schemas.microsoft.com/office/drawing/2010/main" w="9525">
                   <a:solidFill>
                     <a:srgbClr val="000000"/>
                   </a:solidFill>
@@ -20276,7 +20399,7 @@
             </a:ln>
             <a:extLst>
               <a:ext uri="{91240B29-F687-4f45-9708-019B960494DF}">
-                <a14:hiddenLine xmlns:a14="http://schemas.microsoft.com/office/drawing/2010/main" xmlns:p14="http://schemas.microsoft.com/office/powerpoint/2010/main" xmlns:a16="http://schemas.microsoft.com/office/drawing/2014/main" xmlns="" w="9525">
+                <a14:hiddenLine xmlns="" xmlns:a16="http://schemas.microsoft.com/office/drawing/2014/main" xmlns:p14="http://schemas.microsoft.com/office/powerpoint/2010/main" xmlns:a14="http://schemas.microsoft.com/office/drawing/2010/main" w="9525">
                   <a:solidFill>
                     <a:srgbClr val="000000"/>
                   </a:solidFill>
@@ -20719,90 +20842,9 @@
           <a:p>
             <a:r>
               <a:rPr lang="en-US" dirty="0"/>
-              <a:t>With all features from Mutual </a:t>
-            </a:r>
-            <a:r>
-              <a:rPr lang="en-US" dirty="0" err="1"/>
-              <a:t>ınfo</a:t>
-            </a:r>
-            <a:endParaRPr lang="en-US" dirty="0"/>
-          </a:p>
-        </p:txBody>
-      </p:sp>
-      <p:sp>
-        <p:nvSpPr>
-          <p:cNvPr id="5" name="Text Placeholder 4">
-            <a:extLst>
-              <a:ext uri="{FF2B5EF4-FFF2-40B4-BE49-F238E27FC236}">
-                <a16:creationId xmlns:a16="http://schemas.microsoft.com/office/drawing/2014/main" id="{5400970B-5BCE-40B7-8A74-105318B39304}"/>
-              </a:ext>
-            </a:extLst>
-          </p:cNvPr>
-          <p:cNvSpPr>
-            <a:spLocks noGrp="1"/>
-          </p:cNvSpPr>
-          <p:nvPr>
-            <p:ph type="body" sz="quarter" idx="3"/>
-          </p:nvPr>
-        </p:nvSpPr>
-        <p:spPr>
-          <a:xfrm>
-            <a:off x="6172199" y="2123003"/>
-            <a:ext cx="4646602" cy="823912"/>
-          </a:xfrm>
-        </p:spPr>
-        <p:txBody>
-          <a:bodyPr/>
-          <a:lstStyle/>
-          <a:p>
-            <a:r>
-              <a:rPr lang="en-US" dirty="0"/>
-              <a:t>With one variable at the time</a:t>
-            </a:r>
-          </a:p>
-        </p:txBody>
-      </p:sp>
-      <p:sp>
-        <p:nvSpPr>
-          <p:cNvPr id="6" name="Content Placeholder 5">
-            <a:extLst>
-              <a:ext uri="{FF2B5EF4-FFF2-40B4-BE49-F238E27FC236}">
-                <a16:creationId xmlns:a16="http://schemas.microsoft.com/office/drawing/2014/main" id="{1827382A-0520-46A5-8F9D-058D8A6F4B2B}"/>
-              </a:ext>
-            </a:extLst>
-          </p:cNvPr>
-          <p:cNvSpPr>
-            <a:spLocks noGrp="1"/>
-          </p:cNvSpPr>
-          <p:nvPr>
-            <p:ph sz="quarter" idx="4"/>
-          </p:nvPr>
-        </p:nvSpPr>
-        <p:spPr>
-          <a:xfrm>
-            <a:off x="6172199" y="3098795"/>
-            <a:ext cx="4875210" cy="1662120"/>
-          </a:xfrm>
-        </p:spPr>
-        <p:txBody>
-          <a:bodyPr>
-            <a:normAutofit/>
-          </a:bodyPr>
-          <a:lstStyle/>
-          <a:p>
-            <a:r>
-              <a:rPr lang="pt-BR" dirty="0"/>
-              <a:t>R2 train: 0.24</a:t>
-            </a:r>
-          </a:p>
-          <a:p>
-            <a:r>
-              <a:rPr lang="pt-BR" dirty="0"/>
-              <a:t>R2 test:  0.06</a:t>
-            </a:r>
-          </a:p>
-          <a:p>
-            <a:endParaRPr lang="en-US" dirty="0"/>
+              <a:t>With all features</a:t>
+            </a:r>
+            <a:endParaRPr lang="pl-PL" dirty="0"/>
           </a:p>
         </p:txBody>
       </p:sp>
@@ -20839,12 +20881,64 @@
               <a:rPr lang="en-US" dirty="0"/>
               <a:t> R2 test:  0.06</a:t>
             </a:r>
+            <a:endParaRPr lang="pl-PL" dirty="0"/>
           </a:p>
           <a:p>
-            <a:pPr marL="0" indent="0">
-              <a:buNone/>
-            </a:pPr>
+            <a:r>
+              <a:rPr lang="pl-PL" dirty="0" err="1"/>
+              <a:t>Overfitting</a:t>
+            </a:r>
             <a:endParaRPr lang="en-US" dirty="0"/>
+          </a:p>
+        </p:txBody>
+      </p:sp>
+      <p:sp>
+        <p:nvSpPr>
+          <p:cNvPr id="7" name="Symbol zastępczy tekstu 6">
+            <a:extLst>
+              <a:ext uri="{FF2B5EF4-FFF2-40B4-BE49-F238E27FC236}">
+                <a16:creationId xmlns:a16="http://schemas.microsoft.com/office/drawing/2014/main" id="{8DBEA493-D771-4ADD-A4BF-5ECA3D25AAE5}"/>
+              </a:ext>
+            </a:extLst>
+          </p:cNvPr>
+          <p:cNvSpPr>
+            <a:spLocks noGrp="1"/>
+          </p:cNvSpPr>
+          <p:nvPr>
+            <p:ph type="body" sz="quarter" idx="3"/>
+          </p:nvPr>
+        </p:nvSpPr>
+        <p:spPr/>
+        <p:txBody>
+          <a:bodyPr/>
+          <a:lstStyle/>
+          <a:p>
+            <a:endParaRPr lang="pl-PL"/>
+          </a:p>
+        </p:txBody>
+      </p:sp>
+      <p:sp>
+        <p:nvSpPr>
+          <p:cNvPr id="9" name="Symbol zastępczy zawartości 8">
+            <a:extLst>
+              <a:ext uri="{FF2B5EF4-FFF2-40B4-BE49-F238E27FC236}">
+                <a16:creationId xmlns:a16="http://schemas.microsoft.com/office/drawing/2014/main" id="{A779A32F-939D-472A-9466-D28A39415188}"/>
+              </a:ext>
+            </a:extLst>
+          </p:cNvPr>
+          <p:cNvSpPr>
+            <a:spLocks noGrp="1"/>
+          </p:cNvSpPr>
+          <p:nvPr>
+            <p:ph sz="quarter" idx="4"/>
+          </p:nvPr>
+        </p:nvSpPr>
+        <p:spPr/>
+        <p:txBody>
+          <a:bodyPr/>
+          <a:lstStyle/>
+          <a:p>
+            <a:endParaRPr lang="pl-PL"/>
           </a:p>
         </p:txBody>
       </p:sp>
@@ -20862,6 +20956,284 @@
 </file>
 
 <file path=ppt/slides/slide13.xml><?xml version="1.0" encoding="utf-8"?>
+<p:sld xmlns:a="http://schemas.openxmlformats.org/drawingml/2006/main" xmlns:r="http://schemas.openxmlformats.org/officeDocument/2006/relationships" xmlns:p="http://schemas.openxmlformats.org/presentationml/2006/main">
+  <p:cSld>
+    <p:bg>
+      <p:bgPr>
+        <a:blipFill>
+          <a:blip r:embed="rId3">
+            <a:duotone>
+              <a:schemeClr val="bg2">
+                <a:shade val="48000"/>
+                <a:hueMod val="106000"/>
+                <a:satMod val="140000"/>
+                <a:lumMod val="42000"/>
+              </a:schemeClr>
+              <a:schemeClr val="bg2">
+                <a:tint val="98000"/>
+                <a:hueMod val="92000"/>
+                <a:satMod val="220000"/>
+                <a:lumMod val="90000"/>
+              </a:schemeClr>
+            </a:duotone>
+          </a:blip>
+          <a:stretch/>
+        </a:blipFill>
+        <a:effectLst/>
+      </p:bgPr>
+    </p:bg>
+    <p:spTree>
+      <p:nvGrpSpPr>
+        <p:cNvPr id="1" name=""/>
+        <p:cNvGrpSpPr/>
+        <p:nvPr/>
+      </p:nvGrpSpPr>
+      <p:grpSpPr>
+        <a:xfrm>
+          <a:off x="0" y="0"/>
+          <a:ext cx="0" cy="0"/>
+          <a:chOff x="0" y="0"/>
+          <a:chExt cx="0" cy="0"/>
+        </a:xfrm>
+      </p:grpSpPr>
+      <p:sp>
+        <p:nvSpPr>
+          <p:cNvPr id="7" name="Title 6">
+            <a:extLst>
+              <a:ext uri="{FF2B5EF4-FFF2-40B4-BE49-F238E27FC236}">
+                <a16:creationId xmlns:a16="http://schemas.microsoft.com/office/drawing/2014/main" id="{2F93D3C0-41FE-49A0-BF0E-E1AB12D58287}"/>
+              </a:ext>
+            </a:extLst>
+          </p:cNvPr>
+          <p:cNvSpPr>
+            <a:spLocks noGrp="1"/>
+          </p:cNvSpPr>
+          <p:nvPr>
+            <p:ph type="title"/>
+          </p:nvPr>
+        </p:nvSpPr>
+        <p:spPr>
+          <a:xfrm>
+            <a:off x="8036041" y="618518"/>
+            <a:ext cx="3281003" cy="1478570"/>
+          </a:xfrm>
+        </p:spPr>
+        <p:txBody>
+          <a:bodyPr vert="horz" lIns="91440" tIns="45720" rIns="91440" bIns="45720" rtlCol="0" anchor="b">
+            <a:normAutofit/>
+          </a:bodyPr>
+          <a:lstStyle/>
+          <a:p>
+            <a:r>
+              <a:rPr lang="en-US" sz="2800"/>
+              <a:t>Fıghting with overfitting –</a:t>
+            </a:r>
+            <a:r>
+              <a:rPr lang="pl-PL" sz="2800"/>
+              <a:t> rfe</a:t>
+            </a:r>
+            <a:endParaRPr lang="en-US" sz="2800"/>
+          </a:p>
+        </p:txBody>
+      </p:sp>
+      <p:sp>
+        <p:nvSpPr>
+          <p:cNvPr id="75" name="Round Diagonal Corner Rectangle 11">
+            <a:extLst>
+              <a:ext uri="{FF2B5EF4-FFF2-40B4-BE49-F238E27FC236}">
+                <a16:creationId xmlns:a16="http://schemas.microsoft.com/office/drawing/2014/main" id="{E4B7B3E3-827A-48BE-AD67-A57C45AA6949}"/>
+              </a:ext>
+              <a:ext uri="{C183D7F6-B498-43B3-948B-1728B52AA6E4}">
+                <adec:decorative xmlns:adec="http://schemas.microsoft.com/office/drawing/2017/decorative" val="1"/>
+              </a:ext>
+            </a:extLst>
+          </p:cNvPr>
+          <p:cNvSpPr>
+            <a:spLocks noGrp="1" noRot="1" noChangeAspect="1" noMove="1" noResize="1" noEditPoints="1" noAdjustHandles="1" noChangeArrowheads="1" noChangeShapeType="1" noTextEdit="1"/>
+          </p:cNvSpPr>
+          <p:nvPr>
+            <p:extLst>
+              <p:ext uri="{386F3935-93C4-4BCD-93E2-E3B085C9AB24}">
+                <p16:designElem xmlns:p16="http://schemas.microsoft.com/office/powerpoint/2015/main" val="1"/>
+              </p:ext>
+            </p:extLst>
+          </p:nvPr>
+        </p:nvSpPr>
+        <p:spPr>
+          <a:xfrm>
+            <a:off x="798949" y="808057"/>
+            <a:ext cx="6752461" cy="5234394"/>
+          </a:xfrm>
+          <a:prstGeom prst="round2DiagRect">
+            <a:avLst>
+              <a:gd name="adj1" fmla="val 7418"/>
+              <a:gd name="adj2" fmla="val 0"/>
+            </a:avLst>
+          </a:prstGeom>
+          <a:solidFill>
+            <a:srgbClr val="FFFFFF"/>
+          </a:solidFill>
+          <a:ln w="19050" cap="sq">
+            <a:solidFill>
+              <a:schemeClr val="tx2">
+                <a:lumMod val="60000"/>
+                <a:lumOff val="40000"/>
+                <a:alpha val="60000"/>
+              </a:schemeClr>
+            </a:solidFill>
+            <a:miter lim="800000"/>
+          </a:ln>
+          <a:effectLst>
+            <a:outerShdw blurRad="88900" dist="38100" dir="5400000" algn="t" rotWithShape="0">
+              <a:prstClr val="black">
+                <a:alpha val="40000"/>
+              </a:prstClr>
+            </a:outerShdw>
+          </a:effectLst>
+        </p:spPr>
+        <p:style>
+          <a:lnRef idx="2">
+            <a:schemeClr val="accent1">
+              <a:shade val="50000"/>
+            </a:schemeClr>
+          </a:lnRef>
+          <a:fillRef idx="1">
+            <a:schemeClr val="accent1"/>
+          </a:fillRef>
+          <a:effectRef idx="0">
+            <a:schemeClr val="accent1"/>
+          </a:effectRef>
+          <a:fontRef idx="minor">
+            <a:schemeClr val="lt1"/>
+          </a:fontRef>
+        </p:style>
+        <p:txBody>
+          <a:bodyPr rtlCol="0" anchor="ctr"/>
+          <a:lstStyle/>
+          <a:p>
+            <a:pPr algn="ctr"/>
+            <a:endParaRPr lang="en-US"/>
+          </a:p>
+        </p:txBody>
+      </p:sp>
+      <p:pic>
+        <p:nvPicPr>
+          <p:cNvPr id="1030" name="Picture 6">
+            <a:extLst>
+              <a:ext uri="{FF2B5EF4-FFF2-40B4-BE49-F238E27FC236}">
+                <a16:creationId xmlns:a16="http://schemas.microsoft.com/office/drawing/2014/main" id="{41212627-2C17-4F59-98A7-C3525395E6A1}"/>
+              </a:ext>
+            </a:extLst>
+          </p:cNvPr>
+          <p:cNvPicPr>
+            <a:picLocks noChangeAspect="1" noChangeArrowheads="1"/>
+          </p:cNvPicPr>
+          <p:nvPr/>
+        </p:nvPicPr>
+        <p:blipFill>
+          <a:blip r:embed="rId4">
+            <a:extLst>
+              <a:ext uri="{28A0092B-C50C-407E-A947-70E740481C1C}">
+                <a14:useLocalDpi xmlns:a14="http://schemas.microsoft.com/office/drawing/2010/main" val="0"/>
+              </a:ext>
+            </a:extLst>
+          </a:blip>
+          <a:stretch>
+            <a:fillRect/>
+          </a:stretch>
+        </p:blipFill>
+        <p:spPr bwMode="auto">
+          <a:xfrm>
+            <a:off x="1118988" y="2043343"/>
+            <a:ext cx="6303887" cy="2852508"/>
+          </a:xfrm>
+          <a:prstGeom prst="rect">
+            <a:avLst/>
+          </a:prstGeom>
+          <a:noFill/>
+          <a:extLst>
+            <a:ext uri="{909E8E84-426E-40DD-AFC4-6F175D3DCCD1}">
+              <a14:hiddenFill xmlns:a14="http://schemas.microsoft.com/office/drawing/2010/main">
+                <a:solidFill>
+                  <a:srgbClr val="FFFFFF"/>
+                </a:solidFill>
+              </a14:hiddenFill>
+            </a:ext>
+          </a:extLst>
+        </p:spPr>
+      </p:pic>
+      <p:sp>
+        <p:nvSpPr>
+          <p:cNvPr id="19" name="Content Placeholder 18">
+            <a:extLst>
+              <a:ext uri="{FF2B5EF4-FFF2-40B4-BE49-F238E27FC236}">
+                <a16:creationId xmlns:a16="http://schemas.microsoft.com/office/drawing/2014/main" id="{3DA3D83D-136C-4DD1-9F36-1AE5652F0446}"/>
+              </a:ext>
+            </a:extLst>
+          </p:cNvPr>
+          <p:cNvSpPr>
+            <a:spLocks noGrp="1"/>
+          </p:cNvSpPr>
+          <p:nvPr>
+            <p:ph idx="1"/>
+          </p:nvPr>
+        </p:nvSpPr>
+        <p:spPr>
+          <a:xfrm>
+            <a:off x="8036041" y="2249487"/>
+            <a:ext cx="3281004" cy="3541714"/>
+          </a:xfrm>
+        </p:spPr>
+        <p:txBody>
+          <a:bodyPr vert="horz" lIns="91440" tIns="45720" rIns="91440" bIns="45720" rtlCol="0">
+            <a:normAutofit/>
+          </a:bodyPr>
+          <a:lstStyle/>
+          <a:p>
+            <a:pPr marL="0" indent="0">
+              <a:spcAft>
+                <a:spcPts val="600"/>
+              </a:spcAft>
+              <a:buNone/>
+            </a:pPr>
+            <a:r>
+              <a:rPr lang="en-US" sz="1800" cap="all"/>
+              <a:t>R2 train: </a:t>
+            </a:r>
+            <a:r>
+              <a:rPr lang="pl-PL" sz="1800" cap="all"/>
+              <a:t>0.1886</a:t>
+            </a:r>
+            <a:endParaRPr lang="en-US" sz="1800" cap="all"/>
+          </a:p>
+          <a:p>
+            <a:pPr marL="0" indent="0">
+              <a:spcAft>
+                <a:spcPts val="600"/>
+              </a:spcAft>
+              <a:buNone/>
+            </a:pPr>
+            <a:r>
+              <a:rPr lang="en-US" sz="1800" cap="all"/>
+              <a:t>R2 test: 0.1868</a:t>
+            </a:r>
+          </a:p>
+        </p:txBody>
+      </p:sp>
+    </p:spTree>
+    <p:extLst>
+      <p:ext uri="{BB962C8B-B14F-4D97-AF65-F5344CB8AC3E}">
+        <p14:creationId xmlns:p14="http://schemas.microsoft.com/office/powerpoint/2010/main" val="3880014680"/>
+      </p:ext>
+    </p:extLst>
+  </p:cSld>
+  <p:clrMapOvr>
+    <a:masterClrMapping/>
+  </p:clrMapOvr>
+</p:sld>
+</file>
+
+<file path=ppt/slides/slide14.xml><?xml version="1.0" encoding="utf-8"?>
 <p:sld xmlns:a="http://schemas.openxmlformats.org/drawingml/2006/main" xmlns:r="http://schemas.openxmlformats.org/officeDocument/2006/relationships" xmlns:p="http://schemas.openxmlformats.org/presentationml/2006/main">
   <p:cSld>
     <p:bg>
@@ -21042,7 +21414,7 @@
     </p:spTree>
     <p:extLst>
       <p:ext uri="{BB962C8B-B14F-4D97-AF65-F5344CB8AC3E}">
-        <p14:creationId xmlns:p14="http://schemas.microsoft.com/office/powerpoint/2010/main" val="3880014680"/>
+        <p14:creationId xmlns:p14="http://schemas.microsoft.com/office/powerpoint/2010/main" val="4222277930"/>
       </p:ext>
     </p:extLst>
   </p:cSld>
@@ -21052,7 +21424,7 @@
 </p:sld>
 </file>
 
-<file path=ppt/slides/slide14.xml><?xml version="1.0" encoding="utf-8"?>
+<file path=ppt/slides/slide15.xml><?xml version="1.0" encoding="utf-8"?>
 <p:sld xmlns:a="http://schemas.openxmlformats.org/drawingml/2006/main" xmlns:r="http://schemas.openxmlformats.org/officeDocument/2006/relationships" xmlns:p="http://schemas.openxmlformats.org/presentationml/2006/main">
   <p:cSld>
     <p:bg>
@@ -21252,7 +21624,7 @@
 </p:sld>
 </file>
 
-<file path=ppt/slides/slide15.xml><?xml version="1.0" encoding="utf-8"?>
+<file path=ppt/slides/slide16.xml><?xml version="1.0" encoding="utf-8"?>
 <p:sld xmlns:a="http://schemas.openxmlformats.org/drawingml/2006/main" xmlns:r="http://schemas.openxmlformats.org/officeDocument/2006/relationships" xmlns:p="http://schemas.openxmlformats.org/presentationml/2006/main">
   <p:cSld>
     <p:bg>
@@ -21543,7 +21915,7 @@
 </p:sld>
 </file>
 
-<file path=ppt/slides/slide16.xml><?xml version="1.0" encoding="utf-8"?>
+<file path=ppt/slides/slide17.xml><?xml version="1.0" encoding="utf-8"?>
 <p:sld xmlns:a="http://schemas.openxmlformats.org/drawingml/2006/main" xmlns:r="http://schemas.openxmlformats.org/officeDocument/2006/relationships" xmlns:p="http://schemas.openxmlformats.org/presentationml/2006/main">
   <p:cSld>
     <p:bg>
@@ -21757,7 +22129,18 @@
           </a:bodyPr>
           <a:lstStyle/>
           <a:p>
-            <a:endParaRPr lang="en-US" sz="1800"/>
+            <a:r>
+              <a:rPr lang="pt-BR" sz="3200" dirty="0"/>
+              <a:t>R2 train: 0.2270 </a:t>
+            </a:r>
+            <a:endParaRPr lang="pl-PL" sz="3200" dirty="0"/>
+          </a:p>
+          <a:p>
+            <a:r>
+              <a:rPr lang="pt-BR" sz="3200" dirty="0"/>
+              <a:t>R2 test:  0.1984</a:t>
+            </a:r>
+            <a:endParaRPr lang="en-US" sz="3200" dirty="0"/>
           </a:p>
         </p:txBody>
       </p:sp>
@@ -21774,7 +22157,7 @@
 </p:sld>
 </file>
 
-<file path=ppt/slides/slide17.xml><?xml version="1.0" encoding="utf-8"?>
+<file path=ppt/slides/slide18.xml><?xml version="1.0" encoding="utf-8"?>
 <p:sld xmlns:a="http://schemas.openxmlformats.org/drawingml/2006/main" xmlns:r="http://schemas.openxmlformats.org/officeDocument/2006/relationships" xmlns:p="http://schemas.openxmlformats.org/presentationml/2006/main">
   <p:cSld>
     <p:spTree>
@@ -21857,7 +22240,7 @@
 </p:sld>
 </file>
 
-<file path=ppt/slides/slide18.xml><?xml version="1.0" encoding="utf-8"?>
+<file path=ppt/slides/slide19.xml><?xml version="1.0" encoding="utf-8"?>
 <p:sld xmlns:a="http://schemas.openxmlformats.org/drawingml/2006/main" xmlns:r="http://schemas.openxmlformats.org/officeDocument/2006/relationships" xmlns:p="http://schemas.openxmlformats.org/presentationml/2006/main">
   <p:cSld>
     <p:spTree>
@@ -22163,7 +22546,7 @@
             </a:ln>
             <a:extLst>
               <a:ext uri="{91240B29-F687-4f45-9708-019B960494DF}">
-                <a14:hiddenLine xmlns:a14="http://schemas.microsoft.com/office/drawing/2010/main" xmlns:p14="http://schemas.microsoft.com/office/powerpoint/2010/main" xmlns:a16="http://schemas.microsoft.com/office/drawing/2014/main" xmlns="" w="9525">
+                <a14:hiddenLine xmlns="" xmlns:a16="http://schemas.microsoft.com/office/drawing/2014/main" xmlns:p14="http://schemas.microsoft.com/office/powerpoint/2010/main" xmlns:a14="http://schemas.microsoft.com/office/drawing/2010/main" w="9525">
                   <a:solidFill>
                     <a:srgbClr val="000000"/>
                   </a:solidFill>
@@ -22268,7 +22651,7 @@
             </a:ln>
             <a:extLst>
               <a:ext uri="{91240B29-F687-4f45-9708-019B960494DF}">
-                <a14:hiddenLine xmlns:a14="http://schemas.microsoft.com/office/drawing/2010/main" xmlns:p14="http://schemas.microsoft.com/office/powerpoint/2010/main" xmlns:a16="http://schemas.microsoft.com/office/drawing/2014/main" xmlns="" w="9525">
+                <a14:hiddenLine xmlns="" xmlns:a16="http://schemas.microsoft.com/office/drawing/2014/main" xmlns:p14="http://schemas.microsoft.com/office/powerpoint/2010/main" xmlns:a14="http://schemas.microsoft.com/office/drawing/2010/main" w="9525">
                   <a:solidFill>
                     <a:srgbClr val="000000"/>
                   </a:solidFill>
@@ -22373,7 +22756,7 @@
             </a:ln>
             <a:extLst>
               <a:ext uri="{91240B29-F687-4f45-9708-019B960494DF}">
-                <a14:hiddenLine xmlns:a14="http://schemas.microsoft.com/office/drawing/2010/main" xmlns:p14="http://schemas.microsoft.com/office/powerpoint/2010/main" xmlns:a16="http://schemas.microsoft.com/office/drawing/2014/main" xmlns="" w="9525">
+                <a14:hiddenLine xmlns="" xmlns:a16="http://schemas.microsoft.com/office/drawing/2014/main" xmlns:p14="http://schemas.microsoft.com/office/powerpoint/2010/main" xmlns:a14="http://schemas.microsoft.com/office/drawing/2010/main" w="9525">
                   <a:solidFill>
                     <a:srgbClr val="000000"/>
                   </a:solidFill>
@@ -22450,7 +22833,7 @@
             </a:ln>
             <a:extLst>
               <a:ext uri="{91240B29-F687-4f45-9708-019B960494DF}">
-                <a14:hiddenLine xmlns:a14="http://schemas.microsoft.com/office/drawing/2010/main" xmlns:p14="http://schemas.microsoft.com/office/powerpoint/2010/main" xmlns:a16="http://schemas.microsoft.com/office/drawing/2014/main" xmlns="" w="9525">
+                <a14:hiddenLine xmlns="" xmlns:a16="http://schemas.microsoft.com/office/drawing/2014/main" xmlns:p14="http://schemas.microsoft.com/office/powerpoint/2010/main" xmlns:a14="http://schemas.microsoft.com/office/drawing/2010/main" w="9525">
                   <a:solidFill>
                     <a:srgbClr val="000000"/>
                   </a:solidFill>
@@ -22555,7 +22938,7 @@
             </a:ln>
             <a:extLst>
               <a:ext uri="{91240B29-F687-4f45-9708-019B960494DF}">
-                <a14:hiddenLine xmlns:a14="http://schemas.microsoft.com/office/drawing/2010/main" xmlns:p14="http://schemas.microsoft.com/office/powerpoint/2010/main" xmlns:a16="http://schemas.microsoft.com/office/drawing/2014/main" xmlns="" w="9525">
+                <a14:hiddenLine xmlns="" xmlns:a16="http://schemas.microsoft.com/office/drawing/2014/main" xmlns:p14="http://schemas.microsoft.com/office/powerpoint/2010/main" xmlns:a14="http://schemas.microsoft.com/office/drawing/2010/main" w="9525">
                   <a:solidFill>
                     <a:srgbClr val="000000"/>
                   </a:solidFill>
@@ -22632,7 +23015,7 @@
             </a:ln>
             <a:extLst>
               <a:ext uri="{91240B29-F687-4f45-9708-019B960494DF}">
-                <a14:hiddenLine xmlns:a14="http://schemas.microsoft.com/office/drawing/2010/main" xmlns:p14="http://schemas.microsoft.com/office/powerpoint/2010/main" xmlns:a16="http://schemas.microsoft.com/office/drawing/2014/main" xmlns="" w="9525">
+                <a14:hiddenLine xmlns="" xmlns:a16="http://schemas.microsoft.com/office/drawing/2014/main" xmlns:p14="http://schemas.microsoft.com/office/powerpoint/2010/main" xmlns:a14="http://schemas.microsoft.com/office/drawing/2010/main" w="9525">
                   <a:solidFill>
                     <a:srgbClr val="000000"/>
                   </a:solidFill>
@@ -22709,7 +23092,7 @@
             </a:ln>
             <a:extLst>
               <a:ext uri="{91240B29-F687-4f45-9708-019B960494DF}">
-                <a14:hiddenLine xmlns:a14="http://schemas.microsoft.com/office/drawing/2010/main" xmlns:p14="http://schemas.microsoft.com/office/powerpoint/2010/main" xmlns:a16="http://schemas.microsoft.com/office/drawing/2014/main" xmlns="" w="9525">
+                <a14:hiddenLine xmlns="" xmlns:a16="http://schemas.microsoft.com/office/drawing/2014/main" xmlns:p14="http://schemas.microsoft.com/office/powerpoint/2010/main" xmlns:a14="http://schemas.microsoft.com/office/drawing/2010/main" w="9525">
                   <a:solidFill>
                     <a:srgbClr val="000000"/>
                   </a:solidFill>
@@ -22814,7 +23197,7 @@
             </a:ln>
             <a:extLst>
               <a:ext uri="{91240B29-F687-4f45-9708-019B960494DF}">
-                <a14:hiddenLine xmlns:a14="http://schemas.microsoft.com/office/drawing/2010/main" xmlns:p14="http://schemas.microsoft.com/office/powerpoint/2010/main" xmlns:a16="http://schemas.microsoft.com/office/drawing/2014/main" xmlns="" w="9525">
+                <a14:hiddenLine xmlns="" xmlns:a16="http://schemas.microsoft.com/office/drawing/2014/main" xmlns:p14="http://schemas.microsoft.com/office/powerpoint/2010/main" xmlns:a14="http://schemas.microsoft.com/office/drawing/2010/main" w="9525">
                   <a:solidFill>
                     <a:srgbClr val="000000"/>
                   </a:solidFill>
@@ -22919,7 +23302,7 @@
             </a:ln>
             <a:extLst>
               <a:ext uri="{91240B29-F687-4f45-9708-019B960494DF}">
-                <a14:hiddenLine xmlns:a14="http://schemas.microsoft.com/office/drawing/2010/main" xmlns:p14="http://schemas.microsoft.com/office/powerpoint/2010/main" xmlns:a16="http://schemas.microsoft.com/office/drawing/2014/main" xmlns="" w="9525">
+                <a14:hiddenLine xmlns="" xmlns:a16="http://schemas.microsoft.com/office/drawing/2014/main" xmlns:p14="http://schemas.microsoft.com/office/powerpoint/2010/main" xmlns:a14="http://schemas.microsoft.com/office/drawing/2010/main" w="9525">
                   <a:solidFill>
                     <a:srgbClr val="000000"/>
                   </a:solidFill>
@@ -22996,7 +23379,7 @@
             </a:ln>
             <a:extLst>
               <a:ext uri="{91240B29-F687-4f45-9708-019B960494DF}">
-                <a14:hiddenLine xmlns:a14="http://schemas.microsoft.com/office/drawing/2010/main" xmlns:p14="http://schemas.microsoft.com/office/powerpoint/2010/main" xmlns:a16="http://schemas.microsoft.com/office/drawing/2014/main" xmlns="" w="9525">
+                <a14:hiddenLine xmlns="" xmlns:a16="http://schemas.microsoft.com/office/drawing/2014/main" xmlns:p14="http://schemas.microsoft.com/office/powerpoint/2010/main" xmlns:a14="http://schemas.microsoft.com/office/drawing/2010/main" w="9525">
                   <a:solidFill>
                     <a:srgbClr val="000000"/>
                   </a:solidFill>
@@ -23121,7 +23504,7 @@
             </a:ln>
             <a:extLst>
               <a:ext uri="{91240B29-F687-4f45-9708-019B960494DF}">
-                <a14:hiddenLine xmlns:a14="http://schemas.microsoft.com/office/drawing/2010/main" xmlns:p14="http://schemas.microsoft.com/office/powerpoint/2010/main" xmlns:a16="http://schemas.microsoft.com/office/drawing/2014/main" xmlns="" w="9525">
+                <a14:hiddenLine xmlns="" xmlns:a16="http://schemas.microsoft.com/office/drawing/2014/main" xmlns:p14="http://schemas.microsoft.com/office/powerpoint/2010/main" xmlns:a14="http://schemas.microsoft.com/office/drawing/2010/main" w="9525">
                   <a:solidFill>
                     <a:srgbClr val="000000"/>
                   </a:solidFill>
@@ -23235,7 +23618,7 @@
             </a:ln>
             <a:extLst>
               <a:ext uri="{91240B29-F687-4f45-9708-019B960494DF}">
-                <a14:hiddenLine xmlns:a14="http://schemas.microsoft.com/office/drawing/2010/main" xmlns:p14="http://schemas.microsoft.com/office/powerpoint/2010/main" xmlns:a16="http://schemas.microsoft.com/office/drawing/2014/main" xmlns="" w="9525">
+                <a14:hiddenLine xmlns="" xmlns:a16="http://schemas.microsoft.com/office/drawing/2014/main" xmlns:p14="http://schemas.microsoft.com/office/powerpoint/2010/main" xmlns:a14="http://schemas.microsoft.com/office/drawing/2010/main" w="9525">
                   <a:solidFill>
                     <a:srgbClr val="000000"/>
                   </a:solidFill>
@@ -23312,7 +23695,7 @@
             </a:ln>
             <a:extLst>
               <a:ext uri="{91240B29-F687-4f45-9708-019B960494DF}">
-                <a14:hiddenLine xmlns:a14="http://schemas.microsoft.com/office/drawing/2010/main" xmlns:p14="http://schemas.microsoft.com/office/powerpoint/2010/main" xmlns:a16="http://schemas.microsoft.com/office/drawing/2014/main" xmlns="" w="9525">
+                <a14:hiddenLine xmlns="" xmlns:a16="http://schemas.microsoft.com/office/drawing/2014/main" xmlns:p14="http://schemas.microsoft.com/office/powerpoint/2010/main" xmlns:a14="http://schemas.microsoft.com/office/drawing/2010/main" w="9525">
                   <a:solidFill>
                     <a:srgbClr val="000000"/>
                   </a:solidFill>
@@ -23389,7 +23772,7 @@
             </a:ln>
             <a:extLst>
               <a:ext uri="{91240B29-F687-4f45-9708-019B960494DF}">
-                <a14:hiddenLine xmlns:a14="http://schemas.microsoft.com/office/drawing/2010/main" xmlns:p14="http://schemas.microsoft.com/office/powerpoint/2010/main" xmlns:a16="http://schemas.microsoft.com/office/drawing/2014/main" xmlns="" w="9525">
+                <a14:hiddenLine xmlns="" xmlns:a16="http://schemas.microsoft.com/office/drawing/2014/main" xmlns:p14="http://schemas.microsoft.com/office/powerpoint/2010/main" xmlns:a14="http://schemas.microsoft.com/office/drawing/2010/main" w="9525">
                   <a:solidFill>
                     <a:srgbClr val="000000"/>
                   </a:solidFill>
@@ -23494,7 +23877,7 @@
             </a:ln>
             <a:extLst>
               <a:ext uri="{91240B29-F687-4f45-9708-019B960494DF}">
-                <a14:hiddenLine xmlns:a14="http://schemas.microsoft.com/office/drawing/2010/main" xmlns:p14="http://schemas.microsoft.com/office/powerpoint/2010/main" xmlns:a16="http://schemas.microsoft.com/office/drawing/2014/main" xmlns="" w="9525">
+                <a14:hiddenLine xmlns="" xmlns:a16="http://schemas.microsoft.com/office/drawing/2014/main" xmlns:p14="http://schemas.microsoft.com/office/powerpoint/2010/main" xmlns:a14="http://schemas.microsoft.com/office/drawing/2010/main" w="9525">
                   <a:solidFill>
                     <a:srgbClr val="000000"/>
                   </a:solidFill>
@@ -23543,7 +23926,7 @@
             </a:ln>
             <a:extLst>
               <a:ext uri="{91240B29-F687-4f45-9708-019B960494DF}">
-                <a14:hiddenLine xmlns:a14="http://schemas.microsoft.com/office/drawing/2010/main" xmlns:p14="http://schemas.microsoft.com/office/powerpoint/2010/main" xmlns:a16="http://schemas.microsoft.com/office/drawing/2014/main" xmlns="" w="9525">
+                <a14:hiddenLine xmlns="" xmlns:a16="http://schemas.microsoft.com/office/drawing/2014/main" xmlns:p14="http://schemas.microsoft.com/office/powerpoint/2010/main" xmlns:a14="http://schemas.microsoft.com/office/drawing/2010/main" w="9525">
                   <a:solidFill>
                     <a:srgbClr val="000000"/>
                   </a:solidFill>
@@ -23623,7 +24006,7 @@
             </a:ln>
             <a:extLst>
               <a:ext uri="{91240B29-F687-4f45-9708-019B960494DF}">
-                <a14:hiddenLine xmlns:a14="http://schemas.microsoft.com/office/drawing/2010/main" xmlns:p14="http://schemas.microsoft.com/office/powerpoint/2010/main" xmlns:a16="http://schemas.microsoft.com/office/drawing/2014/main" xmlns="" w="9525">
+                <a14:hiddenLine xmlns="" xmlns:a16="http://schemas.microsoft.com/office/drawing/2014/main" xmlns:p14="http://schemas.microsoft.com/office/powerpoint/2010/main" xmlns:a14="http://schemas.microsoft.com/office/drawing/2010/main" w="9525">
                   <a:solidFill>
                     <a:srgbClr val="000000"/>
                   </a:solidFill>
@@ -23728,7 +24111,7 @@
             </a:ln>
             <a:extLst>
               <a:ext uri="{91240B29-F687-4f45-9708-019B960494DF}">
-                <a14:hiddenLine xmlns:a14="http://schemas.microsoft.com/office/drawing/2010/main" xmlns:p14="http://schemas.microsoft.com/office/powerpoint/2010/main" xmlns:a16="http://schemas.microsoft.com/office/drawing/2014/main" xmlns="" w="9525">
+                <a14:hiddenLine xmlns="" xmlns:a16="http://schemas.microsoft.com/office/drawing/2014/main" xmlns:p14="http://schemas.microsoft.com/office/powerpoint/2010/main" xmlns:a14="http://schemas.microsoft.com/office/drawing/2010/main" w="9525">
                   <a:solidFill>
                     <a:srgbClr val="000000"/>
                   </a:solidFill>
@@ -23805,7 +24188,7 @@
             </a:ln>
             <a:extLst>
               <a:ext uri="{91240B29-F687-4f45-9708-019B960494DF}">
-                <a14:hiddenLine xmlns:a14="http://schemas.microsoft.com/office/drawing/2010/main" xmlns:p14="http://schemas.microsoft.com/office/powerpoint/2010/main" xmlns:a16="http://schemas.microsoft.com/office/drawing/2014/main" xmlns="" w="9525">
+                <a14:hiddenLine xmlns="" xmlns:a16="http://schemas.microsoft.com/office/drawing/2014/main" xmlns:p14="http://schemas.microsoft.com/office/powerpoint/2010/main" xmlns:a14="http://schemas.microsoft.com/office/drawing/2010/main" w="9525">
                   <a:solidFill>
                     <a:srgbClr val="000000"/>
                   </a:solidFill>
@@ -23910,7 +24293,7 @@
             </a:ln>
             <a:extLst>
               <a:ext uri="{91240B29-F687-4f45-9708-019B960494DF}">
-                <a14:hiddenLine xmlns:a14="http://schemas.microsoft.com/office/drawing/2010/main" xmlns:p14="http://schemas.microsoft.com/office/powerpoint/2010/main" xmlns:a16="http://schemas.microsoft.com/office/drawing/2014/main" xmlns="" w="9525">
+                <a14:hiddenLine xmlns="" xmlns:a16="http://schemas.microsoft.com/office/drawing/2014/main" xmlns:p14="http://schemas.microsoft.com/office/powerpoint/2010/main" xmlns:a14="http://schemas.microsoft.com/office/drawing/2010/main" w="9525">
                   <a:solidFill>
                     <a:srgbClr val="000000"/>
                   </a:solidFill>
@@ -23990,7 +24373,7 @@
             </a:ln>
             <a:extLst>
               <a:ext uri="{91240B29-F687-4f45-9708-019B960494DF}">
-                <a14:hiddenLine xmlns:a14="http://schemas.microsoft.com/office/drawing/2010/main" xmlns:p14="http://schemas.microsoft.com/office/powerpoint/2010/main" xmlns:a16="http://schemas.microsoft.com/office/drawing/2014/main" xmlns="" w="9525">
+                <a14:hiddenLine xmlns="" xmlns:a16="http://schemas.microsoft.com/office/drawing/2014/main" xmlns:p14="http://schemas.microsoft.com/office/powerpoint/2010/main" xmlns:a14="http://schemas.microsoft.com/office/drawing/2010/main" w="9525">
                   <a:solidFill>
                     <a:srgbClr val="000000"/>
                   </a:solidFill>
@@ -24067,7 +24450,7 @@
             </a:ln>
             <a:extLst>
               <a:ext uri="{91240B29-F687-4f45-9708-019B960494DF}">
-                <a14:hiddenLine xmlns:a14="http://schemas.microsoft.com/office/drawing/2010/main" xmlns:p14="http://schemas.microsoft.com/office/powerpoint/2010/main" xmlns:a16="http://schemas.microsoft.com/office/drawing/2014/main" xmlns="" w="9525">
+                <a14:hiddenLine xmlns="" xmlns:a16="http://schemas.microsoft.com/office/drawing/2014/main" xmlns:p14="http://schemas.microsoft.com/office/powerpoint/2010/main" xmlns:a14="http://schemas.microsoft.com/office/drawing/2010/main" w="9525">
                   <a:solidFill>
                     <a:srgbClr val="000000"/>
                   </a:solidFill>
@@ -24172,7 +24555,7 @@
             </a:ln>
             <a:extLst>
               <a:ext uri="{91240B29-F687-4f45-9708-019B960494DF}">
-                <a14:hiddenLine xmlns:a14="http://schemas.microsoft.com/office/drawing/2010/main" xmlns:p14="http://schemas.microsoft.com/office/powerpoint/2010/main" xmlns:a16="http://schemas.microsoft.com/office/drawing/2014/main" xmlns="" w="9525">
+                <a14:hiddenLine xmlns="" xmlns:a16="http://schemas.microsoft.com/office/drawing/2014/main" xmlns:p14="http://schemas.microsoft.com/office/powerpoint/2010/main" xmlns:a14="http://schemas.microsoft.com/office/drawing/2010/main" w="9525">
                   <a:solidFill>
                     <a:srgbClr val="000000"/>
                   </a:solidFill>
@@ -24277,7 +24660,7 @@
             </a:ln>
             <a:extLst>
               <a:ext uri="{91240B29-F687-4f45-9708-019B960494DF}">
-                <a14:hiddenLine xmlns:a14="http://schemas.microsoft.com/office/drawing/2010/main" xmlns:p14="http://schemas.microsoft.com/office/powerpoint/2010/main" xmlns:a16="http://schemas.microsoft.com/office/drawing/2014/main" xmlns="" w="9525">
+                <a14:hiddenLine xmlns="" xmlns:a16="http://schemas.microsoft.com/office/drawing/2014/main" xmlns:p14="http://schemas.microsoft.com/office/powerpoint/2010/main" xmlns:a14="http://schemas.microsoft.com/office/drawing/2010/main" w="9525">
                   <a:solidFill>
                     <a:srgbClr val="000000"/>
                   </a:solidFill>
@@ -24357,7 +24740,7 @@
             </a:ln>
             <a:extLst>
               <a:ext uri="{91240B29-F687-4f45-9708-019B960494DF}">
-                <a14:hiddenLine xmlns:a14="http://schemas.microsoft.com/office/drawing/2010/main" xmlns:p14="http://schemas.microsoft.com/office/powerpoint/2010/main" xmlns:a16="http://schemas.microsoft.com/office/drawing/2014/main" xmlns="" w="9525">
+                <a14:hiddenLine xmlns="" xmlns:a16="http://schemas.microsoft.com/office/drawing/2014/main" xmlns:p14="http://schemas.microsoft.com/office/powerpoint/2010/main" xmlns:a14="http://schemas.microsoft.com/office/drawing/2010/main" w="9525">
                   <a:solidFill>
                     <a:srgbClr val="000000"/>
                   </a:solidFill>
@@ -24492,7 +24875,7 @@
             </a:ln>
             <a:extLst>
               <a:ext uri="{91240B29-F687-4f45-9708-019B960494DF}">
-                <a14:hiddenLine xmlns:a14="http://schemas.microsoft.com/office/drawing/2010/main" xmlns:p14="http://schemas.microsoft.com/office/powerpoint/2010/main" xmlns:a16="http://schemas.microsoft.com/office/drawing/2014/main" xmlns="" w="9525">
+                <a14:hiddenLine xmlns="" xmlns:a16="http://schemas.microsoft.com/office/drawing/2014/main" xmlns:p14="http://schemas.microsoft.com/office/powerpoint/2010/main" xmlns:a14="http://schemas.microsoft.com/office/drawing/2010/main" w="9525">
                   <a:solidFill>
                     <a:srgbClr val="000000"/>
                   </a:solidFill>
@@ -24797,7 +25180,7 @@
             </a:ln>
             <a:extLst>
               <a:ext uri="{91240B29-F687-4f45-9708-019B960494DF}">
-                <a14:hiddenLine xmlns:a14="http://schemas.microsoft.com/office/drawing/2010/main" xmlns:p14="http://schemas.microsoft.com/office/powerpoint/2010/main" xmlns:a16="http://schemas.microsoft.com/office/drawing/2014/main" xmlns="" w="9525">
+                <a14:hiddenLine xmlns="" xmlns:a16="http://schemas.microsoft.com/office/drawing/2014/main" xmlns:p14="http://schemas.microsoft.com/office/powerpoint/2010/main" xmlns:a14="http://schemas.microsoft.com/office/drawing/2010/main" w="9525">
                   <a:solidFill>
                     <a:srgbClr val="000000"/>
                   </a:solidFill>
@@ -24927,7 +25310,7 @@
             </a:ln>
             <a:extLst>
               <a:ext uri="{91240B29-F687-4f45-9708-019B960494DF}">
-                <a14:hiddenLine xmlns:a14="http://schemas.microsoft.com/office/drawing/2010/main" xmlns:p14="http://schemas.microsoft.com/office/powerpoint/2010/main" xmlns:a16="http://schemas.microsoft.com/office/drawing/2014/main" xmlns="" w="9525">
+                <a14:hiddenLine xmlns="" xmlns:a16="http://schemas.microsoft.com/office/drawing/2014/main" xmlns:p14="http://schemas.microsoft.com/office/powerpoint/2010/main" xmlns:a14="http://schemas.microsoft.com/office/drawing/2010/main" w="9525">
                   <a:solidFill>
                     <a:srgbClr val="000000"/>
                   </a:solidFill>
@@ -25032,7 +25415,7 @@
             </a:ln>
             <a:extLst>
               <a:ext uri="{91240B29-F687-4f45-9708-019B960494DF}">
-                <a14:hiddenLine xmlns:a14="http://schemas.microsoft.com/office/drawing/2010/main" xmlns:p14="http://schemas.microsoft.com/office/powerpoint/2010/main" xmlns:a16="http://schemas.microsoft.com/office/drawing/2014/main" xmlns="" w="9525">
+                <a14:hiddenLine xmlns="" xmlns:a16="http://schemas.microsoft.com/office/drawing/2014/main" xmlns:p14="http://schemas.microsoft.com/office/powerpoint/2010/main" xmlns:a14="http://schemas.microsoft.com/office/drawing/2010/main" w="9525">
                   <a:solidFill>
                     <a:srgbClr val="000000"/>
                   </a:solidFill>
@@ -25112,7 +25495,7 @@
             </a:ln>
             <a:extLst>
               <a:ext uri="{91240B29-F687-4f45-9708-019B960494DF}">
-                <a14:hiddenLine xmlns:a14="http://schemas.microsoft.com/office/drawing/2010/main" xmlns:p14="http://schemas.microsoft.com/office/powerpoint/2010/main" xmlns:a16="http://schemas.microsoft.com/office/drawing/2014/main" xmlns="" w="9525">
+                <a14:hiddenLine xmlns="" xmlns:a16="http://schemas.microsoft.com/office/drawing/2014/main" xmlns:p14="http://schemas.microsoft.com/office/powerpoint/2010/main" xmlns:a14="http://schemas.microsoft.com/office/drawing/2010/main" w="9525">
                   <a:solidFill>
                     <a:srgbClr val="000000"/>
                   </a:solidFill>
@@ -25217,7 +25600,7 @@
             </a:ln>
             <a:extLst>
               <a:ext uri="{91240B29-F687-4f45-9708-019B960494DF}">
-                <a14:hiddenLine xmlns:a14="http://schemas.microsoft.com/office/drawing/2010/main" xmlns:p14="http://schemas.microsoft.com/office/powerpoint/2010/main" xmlns:a16="http://schemas.microsoft.com/office/drawing/2014/main" xmlns="" w="9525">
+                <a14:hiddenLine xmlns="" xmlns:a16="http://schemas.microsoft.com/office/drawing/2014/main" xmlns:p14="http://schemas.microsoft.com/office/powerpoint/2010/main" xmlns:a14="http://schemas.microsoft.com/office/drawing/2010/main" w="9525">
                   <a:solidFill>
                     <a:srgbClr val="000000"/>
                   </a:solidFill>
@@ -25300,7 +25683,7 @@
             </a:ln>
             <a:extLst>
               <a:ext uri="{91240B29-F687-4f45-9708-019B960494DF}">
-                <a14:hiddenLine xmlns:a14="http://schemas.microsoft.com/office/drawing/2010/main" xmlns:p14="http://schemas.microsoft.com/office/powerpoint/2010/main" xmlns:a16="http://schemas.microsoft.com/office/drawing/2014/main" xmlns="" w="9525">
+                <a14:hiddenLine xmlns="" xmlns:a16="http://schemas.microsoft.com/office/drawing/2014/main" xmlns:p14="http://schemas.microsoft.com/office/powerpoint/2010/main" xmlns:a14="http://schemas.microsoft.com/office/drawing/2010/main" w="9525">
                   <a:solidFill>
                     <a:srgbClr val="000000"/>
                   </a:solidFill>
@@ -25405,7 +25788,7 @@
             </a:ln>
             <a:extLst>
               <a:ext uri="{91240B29-F687-4f45-9708-019B960494DF}">
-                <a14:hiddenLine xmlns:a14="http://schemas.microsoft.com/office/drawing/2010/main" xmlns:p14="http://schemas.microsoft.com/office/powerpoint/2010/main" xmlns:a16="http://schemas.microsoft.com/office/drawing/2014/main" xmlns="" w="9525">
+                <a14:hiddenLine xmlns="" xmlns:a16="http://schemas.microsoft.com/office/drawing/2014/main" xmlns:p14="http://schemas.microsoft.com/office/powerpoint/2010/main" xmlns:a14="http://schemas.microsoft.com/office/drawing/2010/main" w="9525">
                   <a:solidFill>
                     <a:srgbClr val="000000"/>
                   </a:solidFill>
@@ -25488,7 +25871,7 @@
             </a:ln>
             <a:extLst>
               <a:ext uri="{91240B29-F687-4f45-9708-019B960494DF}">
-                <a14:hiddenLine xmlns:a14="http://schemas.microsoft.com/office/drawing/2010/main" xmlns:p14="http://schemas.microsoft.com/office/powerpoint/2010/main" xmlns:a16="http://schemas.microsoft.com/office/drawing/2014/main" xmlns="" w="9525">
+                <a14:hiddenLine xmlns="" xmlns:a16="http://schemas.microsoft.com/office/drawing/2014/main" xmlns:p14="http://schemas.microsoft.com/office/powerpoint/2010/main" xmlns:a14="http://schemas.microsoft.com/office/drawing/2010/main" w="9525">
                   <a:solidFill>
                     <a:srgbClr val="000000"/>
                   </a:solidFill>
@@ -25593,7 +25976,7 @@
             </a:ln>
             <a:extLst>
               <a:ext uri="{91240B29-F687-4f45-9708-019B960494DF}">
-                <a14:hiddenLine xmlns:a14="http://schemas.microsoft.com/office/drawing/2010/main" xmlns:p14="http://schemas.microsoft.com/office/powerpoint/2010/main" xmlns:a16="http://schemas.microsoft.com/office/drawing/2014/main" xmlns="" w="9525">
+                <a14:hiddenLine xmlns="" xmlns:a16="http://schemas.microsoft.com/office/drawing/2014/main" xmlns:p14="http://schemas.microsoft.com/office/powerpoint/2010/main" xmlns:a14="http://schemas.microsoft.com/office/drawing/2010/main" w="9525">
                   <a:solidFill>
                     <a:srgbClr val="000000"/>
                   </a:solidFill>
@@ -25642,7 +26025,7 @@
             </a:ln>
             <a:extLst>
               <a:ext uri="{91240B29-F687-4f45-9708-019B960494DF}">
-                <a14:hiddenLine xmlns:a14="http://schemas.microsoft.com/office/drawing/2010/main" xmlns:p14="http://schemas.microsoft.com/office/powerpoint/2010/main" xmlns:a16="http://schemas.microsoft.com/office/drawing/2014/main" xmlns="" w="9525">
+                <a14:hiddenLine xmlns="" xmlns:a16="http://schemas.microsoft.com/office/drawing/2014/main" xmlns:p14="http://schemas.microsoft.com/office/powerpoint/2010/main" xmlns:a14="http://schemas.microsoft.com/office/drawing/2010/main" w="9525">
                   <a:solidFill>
                     <a:srgbClr val="000000"/>
                   </a:solidFill>
@@ -26062,7 +26445,7 @@
           <a:noFill/>
           <a:extLst>
             <a:ext uri="{909E8E84-426E-40dd-AFC4-6F175D3DCCD1}">
-              <a14:hiddenFill xmlns:a14="http://schemas.microsoft.com/office/drawing/2010/main" xmlns:p14="http://schemas.microsoft.com/office/powerpoint/2010/main" xmlns:a16="http://schemas.microsoft.com/office/drawing/2014/main" xmlns="">
+              <a14:hiddenFill xmlns="" xmlns:a16="http://schemas.microsoft.com/office/drawing/2014/main" xmlns:p14="http://schemas.microsoft.com/office/powerpoint/2010/main" xmlns:a14="http://schemas.microsoft.com/office/drawing/2010/main">
                 <a:solidFill>
                   <a:srgbClr val="FFFFFF"/>
                 </a:solidFill>
@@ -26183,7 +26566,7 @@
               </a:ln>
               <a:extLst>
                 <a:ext uri="{91240B29-F687-4f45-9708-019B960494DF}">
-                  <a14:hiddenLine xmlns:a14="http://schemas.microsoft.com/office/drawing/2010/main" xmlns:p14="http://schemas.microsoft.com/office/powerpoint/2010/main" xmlns:a16="http://schemas.microsoft.com/office/drawing/2014/main" xmlns="" w="9525">
+                  <a14:hiddenLine xmlns="" xmlns:a16="http://schemas.microsoft.com/office/drawing/2014/main" xmlns:p14="http://schemas.microsoft.com/office/powerpoint/2010/main" xmlns:a14="http://schemas.microsoft.com/office/drawing/2010/main" w="9525">
                     <a:solidFill>
                       <a:srgbClr val="000000"/>
                     </a:solidFill>
@@ -26288,7 +26671,7 @@
               </a:ln>
               <a:extLst>
                 <a:ext uri="{91240B29-F687-4f45-9708-019B960494DF}">
-                  <a14:hiddenLine xmlns:a14="http://schemas.microsoft.com/office/drawing/2010/main" xmlns:p14="http://schemas.microsoft.com/office/powerpoint/2010/main" xmlns:a16="http://schemas.microsoft.com/office/drawing/2014/main" xmlns="" w="9525">
+                  <a14:hiddenLine xmlns="" xmlns:a16="http://schemas.microsoft.com/office/drawing/2014/main" xmlns:p14="http://schemas.microsoft.com/office/powerpoint/2010/main" xmlns:a14="http://schemas.microsoft.com/office/drawing/2010/main" w="9525">
                     <a:solidFill>
                       <a:srgbClr val="000000"/>
                     </a:solidFill>
@@ -26393,7 +26776,7 @@
               </a:ln>
               <a:extLst>
                 <a:ext uri="{91240B29-F687-4f45-9708-019B960494DF}">
-                  <a14:hiddenLine xmlns:a14="http://schemas.microsoft.com/office/drawing/2010/main" xmlns:p14="http://schemas.microsoft.com/office/powerpoint/2010/main" xmlns:a16="http://schemas.microsoft.com/office/drawing/2014/main" xmlns="" w="9525">
+                  <a14:hiddenLine xmlns="" xmlns:a16="http://schemas.microsoft.com/office/drawing/2014/main" xmlns:p14="http://schemas.microsoft.com/office/powerpoint/2010/main" xmlns:a14="http://schemas.microsoft.com/office/drawing/2010/main" w="9525">
                     <a:solidFill>
                       <a:srgbClr val="000000"/>
                     </a:solidFill>
@@ -26470,7 +26853,7 @@
               </a:ln>
               <a:extLst>
                 <a:ext uri="{91240B29-F687-4f45-9708-019B960494DF}">
-                  <a14:hiddenLine xmlns:a14="http://schemas.microsoft.com/office/drawing/2010/main" xmlns:p14="http://schemas.microsoft.com/office/powerpoint/2010/main" xmlns:a16="http://schemas.microsoft.com/office/drawing/2014/main" xmlns="" w="9525">
+                  <a14:hiddenLine xmlns="" xmlns:a16="http://schemas.microsoft.com/office/drawing/2014/main" xmlns:p14="http://schemas.microsoft.com/office/powerpoint/2010/main" xmlns:a14="http://schemas.microsoft.com/office/drawing/2010/main" w="9525">
                     <a:solidFill>
                       <a:srgbClr val="000000"/>
                     </a:solidFill>
@@ -26575,7 +26958,7 @@
               </a:ln>
               <a:extLst>
                 <a:ext uri="{91240B29-F687-4f45-9708-019B960494DF}">
-                  <a14:hiddenLine xmlns:a14="http://schemas.microsoft.com/office/drawing/2010/main" xmlns:p14="http://schemas.microsoft.com/office/powerpoint/2010/main" xmlns:a16="http://schemas.microsoft.com/office/drawing/2014/main" xmlns="" w="9525">
+                  <a14:hiddenLine xmlns="" xmlns:a16="http://schemas.microsoft.com/office/drawing/2014/main" xmlns:p14="http://schemas.microsoft.com/office/powerpoint/2010/main" xmlns:a14="http://schemas.microsoft.com/office/drawing/2010/main" w="9525">
                     <a:solidFill>
                       <a:srgbClr val="000000"/>
                     </a:solidFill>
@@ -26652,7 +27035,7 @@
               </a:ln>
               <a:extLst>
                 <a:ext uri="{91240B29-F687-4f45-9708-019B960494DF}">
-                  <a14:hiddenLine xmlns:a14="http://schemas.microsoft.com/office/drawing/2010/main" xmlns:p14="http://schemas.microsoft.com/office/powerpoint/2010/main" xmlns:a16="http://schemas.microsoft.com/office/drawing/2014/main" xmlns="" w="9525">
+                  <a14:hiddenLine xmlns="" xmlns:a16="http://schemas.microsoft.com/office/drawing/2014/main" xmlns:p14="http://schemas.microsoft.com/office/powerpoint/2010/main" xmlns:a14="http://schemas.microsoft.com/office/drawing/2010/main" w="9525">
                     <a:solidFill>
                       <a:srgbClr val="000000"/>
                     </a:solidFill>
@@ -26729,7 +27112,7 @@
               </a:ln>
               <a:extLst>
                 <a:ext uri="{91240B29-F687-4f45-9708-019B960494DF}">
-                  <a14:hiddenLine xmlns:a14="http://schemas.microsoft.com/office/drawing/2010/main" xmlns:p14="http://schemas.microsoft.com/office/powerpoint/2010/main" xmlns:a16="http://schemas.microsoft.com/office/drawing/2014/main" xmlns="" w="9525">
+                  <a14:hiddenLine xmlns="" xmlns:a16="http://schemas.microsoft.com/office/drawing/2014/main" xmlns:p14="http://schemas.microsoft.com/office/powerpoint/2010/main" xmlns:a14="http://schemas.microsoft.com/office/drawing/2010/main" w="9525">
                     <a:solidFill>
                       <a:srgbClr val="000000"/>
                     </a:solidFill>
@@ -26834,7 +27217,7 @@
               </a:ln>
               <a:extLst>
                 <a:ext uri="{91240B29-F687-4f45-9708-019B960494DF}">
-                  <a14:hiddenLine xmlns:a14="http://schemas.microsoft.com/office/drawing/2010/main" xmlns:p14="http://schemas.microsoft.com/office/powerpoint/2010/main" xmlns:a16="http://schemas.microsoft.com/office/drawing/2014/main" xmlns="" w="9525">
+                  <a14:hiddenLine xmlns="" xmlns:a16="http://schemas.microsoft.com/office/drawing/2014/main" xmlns:p14="http://schemas.microsoft.com/office/powerpoint/2010/main" xmlns:a14="http://schemas.microsoft.com/office/drawing/2010/main" w="9525">
                     <a:solidFill>
                       <a:srgbClr val="000000"/>
                     </a:solidFill>
@@ -26939,7 +27322,7 @@
               </a:ln>
               <a:extLst>
                 <a:ext uri="{91240B29-F687-4f45-9708-019B960494DF}">
-                  <a14:hiddenLine xmlns:a14="http://schemas.microsoft.com/office/drawing/2010/main" xmlns:p14="http://schemas.microsoft.com/office/powerpoint/2010/main" xmlns:a16="http://schemas.microsoft.com/office/drawing/2014/main" xmlns="" w="9525">
+                  <a14:hiddenLine xmlns="" xmlns:a16="http://schemas.microsoft.com/office/drawing/2014/main" xmlns:p14="http://schemas.microsoft.com/office/powerpoint/2010/main" xmlns:a14="http://schemas.microsoft.com/office/drawing/2010/main" w="9525">
                     <a:solidFill>
                       <a:srgbClr val="000000"/>
                     </a:solidFill>
@@ -27016,7 +27399,7 @@
               </a:ln>
               <a:extLst>
                 <a:ext uri="{91240B29-F687-4f45-9708-019B960494DF}">
-                  <a14:hiddenLine xmlns:a14="http://schemas.microsoft.com/office/drawing/2010/main" xmlns:p14="http://schemas.microsoft.com/office/powerpoint/2010/main" xmlns:a16="http://schemas.microsoft.com/office/drawing/2014/main" xmlns="" w="9525">
+                  <a14:hiddenLine xmlns="" xmlns:a16="http://schemas.microsoft.com/office/drawing/2014/main" xmlns:p14="http://schemas.microsoft.com/office/powerpoint/2010/main" xmlns:a14="http://schemas.microsoft.com/office/drawing/2010/main" w="9525">
                     <a:solidFill>
                       <a:srgbClr val="000000"/>
                     </a:solidFill>
@@ -27141,7 +27524,7 @@
               </a:ln>
               <a:extLst>
                 <a:ext uri="{91240B29-F687-4f45-9708-019B960494DF}">
-                  <a14:hiddenLine xmlns:a14="http://schemas.microsoft.com/office/drawing/2010/main" xmlns:p14="http://schemas.microsoft.com/office/powerpoint/2010/main" xmlns:a16="http://schemas.microsoft.com/office/drawing/2014/main" xmlns="" w="9525">
+                  <a14:hiddenLine xmlns="" xmlns:a16="http://schemas.microsoft.com/office/drawing/2014/main" xmlns:p14="http://schemas.microsoft.com/office/powerpoint/2010/main" xmlns:a14="http://schemas.microsoft.com/office/drawing/2010/main" w="9525">
                     <a:solidFill>
                       <a:srgbClr val="000000"/>
                     </a:solidFill>
@@ -27255,7 +27638,7 @@
               </a:ln>
               <a:extLst>
                 <a:ext uri="{91240B29-F687-4f45-9708-019B960494DF}">
-                  <a14:hiddenLine xmlns:a14="http://schemas.microsoft.com/office/drawing/2010/main" xmlns:p14="http://schemas.microsoft.com/office/powerpoint/2010/main" xmlns:a16="http://schemas.microsoft.com/office/drawing/2014/main" xmlns="" w="9525">
+                  <a14:hiddenLine xmlns="" xmlns:a16="http://schemas.microsoft.com/office/drawing/2014/main" xmlns:p14="http://schemas.microsoft.com/office/powerpoint/2010/main" xmlns:a14="http://schemas.microsoft.com/office/drawing/2010/main" w="9525">
                     <a:solidFill>
                       <a:srgbClr val="000000"/>
                     </a:solidFill>
@@ -27332,7 +27715,7 @@
               </a:ln>
               <a:extLst>
                 <a:ext uri="{91240B29-F687-4f45-9708-019B960494DF}">
-                  <a14:hiddenLine xmlns:a14="http://schemas.microsoft.com/office/drawing/2010/main" xmlns:p14="http://schemas.microsoft.com/office/powerpoint/2010/main" xmlns:a16="http://schemas.microsoft.com/office/drawing/2014/main" xmlns="" w="9525">
+                  <a14:hiddenLine xmlns="" xmlns:a16="http://schemas.microsoft.com/office/drawing/2014/main" xmlns:p14="http://schemas.microsoft.com/office/powerpoint/2010/main" xmlns:a14="http://schemas.microsoft.com/office/drawing/2010/main" w="9525">
                     <a:solidFill>
                       <a:srgbClr val="000000"/>
                     </a:solidFill>
@@ -27409,7 +27792,7 @@
               </a:ln>
               <a:extLst>
                 <a:ext uri="{91240B29-F687-4f45-9708-019B960494DF}">
-                  <a14:hiddenLine xmlns:a14="http://schemas.microsoft.com/office/drawing/2010/main" xmlns:p14="http://schemas.microsoft.com/office/powerpoint/2010/main" xmlns:a16="http://schemas.microsoft.com/office/drawing/2014/main" xmlns="" w="9525">
+                  <a14:hiddenLine xmlns="" xmlns:a16="http://schemas.microsoft.com/office/drawing/2014/main" xmlns:p14="http://schemas.microsoft.com/office/powerpoint/2010/main" xmlns:a14="http://schemas.microsoft.com/office/drawing/2010/main" w="9525">
                     <a:solidFill>
                       <a:srgbClr val="000000"/>
                     </a:solidFill>
@@ -27514,7 +27897,7 @@
               </a:ln>
               <a:extLst>
                 <a:ext uri="{91240B29-F687-4f45-9708-019B960494DF}">
-                  <a14:hiddenLine xmlns:a14="http://schemas.microsoft.com/office/drawing/2010/main" xmlns:p14="http://schemas.microsoft.com/office/powerpoint/2010/main" xmlns:a16="http://schemas.microsoft.com/office/drawing/2014/main" xmlns="" w="9525">
+                  <a14:hiddenLine xmlns="" xmlns:a16="http://schemas.microsoft.com/office/drawing/2014/main" xmlns:p14="http://schemas.microsoft.com/office/powerpoint/2010/main" xmlns:a14="http://schemas.microsoft.com/office/drawing/2010/main" w="9525">
                     <a:solidFill>
                       <a:srgbClr val="000000"/>
                     </a:solidFill>
@@ -27563,7 +27946,7 @@
               </a:ln>
               <a:extLst>
                 <a:ext uri="{91240B29-F687-4f45-9708-019B960494DF}">
-                  <a14:hiddenLine xmlns:a14="http://schemas.microsoft.com/office/drawing/2010/main" xmlns:p14="http://schemas.microsoft.com/office/powerpoint/2010/main" xmlns:a16="http://schemas.microsoft.com/office/drawing/2014/main" xmlns="" w="9525">
+                  <a14:hiddenLine xmlns="" xmlns:a16="http://schemas.microsoft.com/office/drawing/2014/main" xmlns:p14="http://schemas.microsoft.com/office/powerpoint/2010/main" xmlns:a14="http://schemas.microsoft.com/office/drawing/2010/main" w="9525">
                     <a:solidFill>
                       <a:srgbClr val="000000"/>
                     </a:solidFill>
@@ -27643,7 +28026,7 @@
               </a:ln>
               <a:extLst>
                 <a:ext uri="{91240B29-F687-4f45-9708-019B960494DF}">
-                  <a14:hiddenLine xmlns:a14="http://schemas.microsoft.com/office/drawing/2010/main" xmlns:p14="http://schemas.microsoft.com/office/powerpoint/2010/main" xmlns:a16="http://schemas.microsoft.com/office/drawing/2014/main" xmlns="" w="9525">
+                  <a14:hiddenLine xmlns="" xmlns:a16="http://schemas.microsoft.com/office/drawing/2014/main" xmlns:p14="http://schemas.microsoft.com/office/powerpoint/2010/main" xmlns:a14="http://schemas.microsoft.com/office/drawing/2010/main" w="9525">
                     <a:solidFill>
                       <a:srgbClr val="000000"/>
                     </a:solidFill>
@@ -27748,7 +28131,7 @@
               </a:ln>
               <a:extLst>
                 <a:ext uri="{91240B29-F687-4f45-9708-019B960494DF}">
-                  <a14:hiddenLine xmlns:a14="http://schemas.microsoft.com/office/drawing/2010/main" xmlns:p14="http://schemas.microsoft.com/office/powerpoint/2010/main" xmlns:a16="http://schemas.microsoft.com/office/drawing/2014/main" xmlns="" w="9525">
+                  <a14:hiddenLine xmlns="" xmlns:a16="http://schemas.microsoft.com/office/drawing/2014/main" xmlns:p14="http://schemas.microsoft.com/office/powerpoint/2010/main" xmlns:a14="http://schemas.microsoft.com/office/drawing/2010/main" w="9525">
                     <a:solidFill>
                       <a:srgbClr val="000000"/>
                     </a:solidFill>
@@ -27825,7 +28208,7 @@
               </a:ln>
               <a:extLst>
                 <a:ext uri="{91240B29-F687-4f45-9708-019B960494DF}">
-                  <a14:hiddenLine xmlns:a14="http://schemas.microsoft.com/office/drawing/2010/main" xmlns:p14="http://schemas.microsoft.com/office/powerpoint/2010/main" xmlns:a16="http://schemas.microsoft.com/office/drawing/2014/main" xmlns="" w="9525">
+                  <a14:hiddenLine xmlns="" xmlns:a16="http://schemas.microsoft.com/office/drawing/2014/main" xmlns:p14="http://schemas.microsoft.com/office/powerpoint/2010/main" xmlns:a14="http://schemas.microsoft.com/office/drawing/2010/main" w="9525">
                     <a:solidFill>
                       <a:srgbClr val="000000"/>
                     </a:solidFill>
@@ -27930,7 +28313,7 @@
               </a:ln>
               <a:extLst>
                 <a:ext uri="{91240B29-F687-4f45-9708-019B960494DF}">
-                  <a14:hiddenLine xmlns:a14="http://schemas.microsoft.com/office/drawing/2010/main" xmlns:p14="http://schemas.microsoft.com/office/powerpoint/2010/main" xmlns:a16="http://schemas.microsoft.com/office/drawing/2014/main" xmlns="" w="9525">
+                  <a14:hiddenLine xmlns="" xmlns:a16="http://schemas.microsoft.com/office/drawing/2014/main" xmlns:p14="http://schemas.microsoft.com/office/powerpoint/2010/main" xmlns:a14="http://schemas.microsoft.com/office/drawing/2010/main" w="9525">
                     <a:solidFill>
                       <a:srgbClr val="000000"/>
                     </a:solidFill>
@@ -28010,7 +28393,7 @@
               </a:ln>
               <a:extLst>
                 <a:ext uri="{91240B29-F687-4f45-9708-019B960494DF}">
-                  <a14:hiddenLine xmlns:a14="http://schemas.microsoft.com/office/drawing/2010/main" xmlns:p14="http://schemas.microsoft.com/office/powerpoint/2010/main" xmlns:a16="http://schemas.microsoft.com/office/drawing/2014/main" xmlns="" w="9525">
+                  <a14:hiddenLine xmlns="" xmlns:a16="http://schemas.microsoft.com/office/drawing/2014/main" xmlns:p14="http://schemas.microsoft.com/office/powerpoint/2010/main" xmlns:a14="http://schemas.microsoft.com/office/drawing/2010/main" w="9525">
                     <a:solidFill>
                       <a:srgbClr val="000000"/>
                     </a:solidFill>
@@ -28087,7 +28470,7 @@
               </a:ln>
               <a:extLst>
                 <a:ext uri="{91240B29-F687-4f45-9708-019B960494DF}">
-                  <a14:hiddenLine xmlns:a14="http://schemas.microsoft.com/office/drawing/2010/main" xmlns:p14="http://schemas.microsoft.com/office/powerpoint/2010/main" xmlns:a16="http://schemas.microsoft.com/office/drawing/2014/main" xmlns="" w="9525">
+                  <a14:hiddenLine xmlns="" xmlns:a16="http://schemas.microsoft.com/office/drawing/2014/main" xmlns:p14="http://schemas.microsoft.com/office/powerpoint/2010/main" xmlns:a14="http://schemas.microsoft.com/office/drawing/2010/main" w="9525">
                     <a:solidFill>
                       <a:srgbClr val="000000"/>
                     </a:solidFill>
@@ -28192,7 +28575,7 @@
               </a:ln>
               <a:extLst>
                 <a:ext uri="{91240B29-F687-4f45-9708-019B960494DF}">
-                  <a14:hiddenLine xmlns:a14="http://schemas.microsoft.com/office/drawing/2010/main" xmlns:p14="http://schemas.microsoft.com/office/powerpoint/2010/main" xmlns:a16="http://schemas.microsoft.com/office/drawing/2014/main" xmlns="" w="9525">
+                  <a14:hiddenLine xmlns="" xmlns:a16="http://schemas.microsoft.com/office/drawing/2014/main" xmlns:p14="http://schemas.microsoft.com/office/powerpoint/2010/main" xmlns:a14="http://schemas.microsoft.com/office/drawing/2010/main" w="9525">
                     <a:solidFill>
                       <a:srgbClr val="000000"/>
                     </a:solidFill>
@@ -28297,7 +28680,7 @@
               </a:ln>
               <a:extLst>
                 <a:ext uri="{91240B29-F687-4f45-9708-019B960494DF}">
-                  <a14:hiddenLine xmlns:a14="http://schemas.microsoft.com/office/drawing/2010/main" xmlns:p14="http://schemas.microsoft.com/office/powerpoint/2010/main" xmlns:a16="http://schemas.microsoft.com/office/drawing/2014/main" xmlns="" w="9525">
+                  <a14:hiddenLine xmlns="" xmlns:a16="http://schemas.microsoft.com/office/drawing/2014/main" xmlns:p14="http://schemas.microsoft.com/office/powerpoint/2010/main" xmlns:a14="http://schemas.microsoft.com/office/drawing/2010/main" w="9525">
                     <a:solidFill>
                       <a:srgbClr val="000000"/>
                     </a:solidFill>
@@ -28377,7 +28760,7 @@
               </a:ln>
               <a:extLst>
                 <a:ext uri="{91240B29-F687-4f45-9708-019B960494DF}">
-                  <a14:hiddenLine xmlns:a14="http://schemas.microsoft.com/office/drawing/2010/main" xmlns:p14="http://schemas.microsoft.com/office/powerpoint/2010/main" xmlns:a16="http://schemas.microsoft.com/office/drawing/2014/main" xmlns="" w="9525">
+                  <a14:hiddenLine xmlns="" xmlns:a16="http://schemas.microsoft.com/office/drawing/2014/main" xmlns:p14="http://schemas.microsoft.com/office/powerpoint/2010/main" xmlns:a14="http://schemas.microsoft.com/office/drawing/2010/main" w="9525">
                     <a:solidFill>
                       <a:srgbClr val="000000"/>
                     </a:solidFill>
@@ -28512,7 +28895,7 @@
               </a:ln>
               <a:extLst>
                 <a:ext uri="{91240B29-F687-4f45-9708-019B960494DF}">
-                  <a14:hiddenLine xmlns:a14="http://schemas.microsoft.com/office/drawing/2010/main" xmlns:p14="http://schemas.microsoft.com/office/powerpoint/2010/main" xmlns:a16="http://schemas.microsoft.com/office/drawing/2014/main" xmlns="" w="9525">
+                  <a14:hiddenLine xmlns="" xmlns:a16="http://schemas.microsoft.com/office/drawing/2014/main" xmlns:p14="http://schemas.microsoft.com/office/powerpoint/2010/main" xmlns:a14="http://schemas.microsoft.com/office/drawing/2010/main" w="9525">
                     <a:solidFill>
                       <a:srgbClr val="000000"/>
                     </a:solidFill>
@@ -28623,7 +29006,7 @@
               </a:ln>
               <a:extLst>
                 <a:ext uri="{91240B29-F687-4f45-9708-019B960494DF}">
-                  <a14:hiddenLine xmlns:a14="http://schemas.microsoft.com/office/drawing/2010/main" xmlns:p14="http://schemas.microsoft.com/office/powerpoint/2010/main" xmlns:a16="http://schemas.microsoft.com/office/drawing/2014/main" xmlns="" w="9525">
+                  <a14:hiddenLine xmlns="" xmlns:a16="http://schemas.microsoft.com/office/drawing/2014/main" xmlns:p14="http://schemas.microsoft.com/office/powerpoint/2010/main" xmlns:a14="http://schemas.microsoft.com/office/drawing/2010/main" w="9525">
                     <a:solidFill>
                       <a:srgbClr val="000000"/>
                     </a:solidFill>
@@ -28753,7 +29136,7 @@
               </a:ln>
               <a:extLst>
                 <a:ext uri="{91240B29-F687-4f45-9708-019B960494DF}">
-                  <a14:hiddenLine xmlns:a14="http://schemas.microsoft.com/office/drawing/2010/main" xmlns:p14="http://schemas.microsoft.com/office/powerpoint/2010/main" xmlns:a16="http://schemas.microsoft.com/office/drawing/2014/main" xmlns="" w="9525">
+                  <a14:hiddenLine xmlns="" xmlns:a16="http://schemas.microsoft.com/office/drawing/2014/main" xmlns:p14="http://schemas.microsoft.com/office/powerpoint/2010/main" xmlns:a14="http://schemas.microsoft.com/office/drawing/2010/main" w="9525">
                     <a:solidFill>
                       <a:srgbClr val="000000"/>
                     </a:solidFill>
@@ -28858,7 +29241,7 @@
               </a:ln>
               <a:extLst>
                 <a:ext uri="{91240B29-F687-4f45-9708-019B960494DF}">
-                  <a14:hiddenLine xmlns:a14="http://schemas.microsoft.com/office/drawing/2010/main" xmlns:p14="http://schemas.microsoft.com/office/powerpoint/2010/main" xmlns:a16="http://schemas.microsoft.com/office/drawing/2014/main" xmlns="" w="9525">
+                  <a14:hiddenLine xmlns="" xmlns:a16="http://schemas.microsoft.com/office/drawing/2014/main" xmlns:p14="http://schemas.microsoft.com/office/powerpoint/2010/main" xmlns:a14="http://schemas.microsoft.com/office/drawing/2010/main" w="9525">
                     <a:solidFill>
                       <a:srgbClr val="000000"/>
                     </a:solidFill>
@@ -28938,7 +29321,7 @@
               </a:ln>
               <a:extLst>
                 <a:ext uri="{91240B29-F687-4f45-9708-019B960494DF}">
-                  <a14:hiddenLine xmlns:a14="http://schemas.microsoft.com/office/drawing/2010/main" xmlns:p14="http://schemas.microsoft.com/office/powerpoint/2010/main" xmlns:a16="http://schemas.microsoft.com/office/drawing/2014/main" xmlns="" w="9525">
+                  <a14:hiddenLine xmlns="" xmlns:a16="http://schemas.microsoft.com/office/drawing/2014/main" xmlns:p14="http://schemas.microsoft.com/office/powerpoint/2010/main" xmlns:a14="http://schemas.microsoft.com/office/drawing/2010/main" w="9525">
                     <a:solidFill>
                       <a:srgbClr val="000000"/>
                     </a:solidFill>
@@ -29043,7 +29426,7 @@
               </a:ln>
               <a:extLst>
                 <a:ext uri="{91240B29-F687-4f45-9708-019B960494DF}">
-                  <a14:hiddenLine xmlns:a14="http://schemas.microsoft.com/office/drawing/2010/main" xmlns:p14="http://schemas.microsoft.com/office/powerpoint/2010/main" xmlns:a16="http://schemas.microsoft.com/office/drawing/2014/main" xmlns="" w="9525">
+                  <a14:hiddenLine xmlns="" xmlns:a16="http://schemas.microsoft.com/office/drawing/2014/main" xmlns:p14="http://schemas.microsoft.com/office/powerpoint/2010/main" xmlns:a14="http://schemas.microsoft.com/office/drawing/2010/main" w="9525">
                     <a:solidFill>
                       <a:srgbClr val="000000"/>
                     </a:solidFill>
@@ -29126,7 +29509,7 @@
               </a:ln>
               <a:extLst>
                 <a:ext uri="{91240B29-F687-4f45-9708-019B960494DF}">
-                  <a14:hiddenLine xmlns:a14="http://schemas.microsoft.com/office/drawing/2010/main" xmlns:p14="http://schemas.microsoft.com/office/powerpoint/2010/main" xmlns:a16="http://schemas.microsoft.com/office/drawing/2014/main" xmlns="" w="9525">
+                  <a14:hiddenLine xmlns="" xmlns:a16="http://schemas.microsoft.com/office/drawing/2014/main" xmlns:p14="http://schemas.microsoft.com/office/powerpoint/2010/main" xmlns:a14="http://schemas.microsoft.com/office/drawing/2010/main" w="9525">
                     <a:solidFill>
                       <a:srgbClr val="000000"/>
                     </a:solidFill>
@@ -29231,7 +29614,7 @@
               </a:ln>
               <a:extLst>
                 <a:ext uri="{91240B29-F687-4f45-9708-019B960494DF}">
-                  <a14:hiddenLine xmlns:a14="http://schemas.microsoft.com/office/drawing/2010/main" xmlns:p14="http://schemas.microsoft.com/office/powerpoint/2010/main" xmlns:a16="http://schemas.microsoft.com/office/drawing/2014/main" xmlns="" w="9525">
+                  <a14:hiddenLine xmlns="" xmlns:a16="http://schemas.microsoft.com/office/drawing/2014/main" xmlns:p14="http://schemas.microsoft.com/office/powerpoint/2010/main" xmlns:a14="http://schemas.microsoft.com/office/drawing/2010/main" w="9525">
                     <a:solidFill>
                       <a:srgbClr val="000000"/>
                     </a:solidFill>
@@ -29314,7 +29697,7 @@
               </a:ln>
               <a:extLst>
                 <a:ext uri="{91240B29-F687-4f45-9708-019B960494DF}">
-                  <a14:hiddenLine xmlns:a14="http://schemas.microsoft.com/office/drawing/2010/main" xmlns:p14="http://schemas.microsoft.com/office/powerpoint/2010/main" xmlns:a16="http://schemas.microsoft.com/office/drawing/2014/main" xmlns="" w="9525">
+                  <a14:hiddenLine xmlns="" xmlns:a16="http://schemas.microsoft.com/office/drawing/2014/main" xmlns:p14="http://schemas.microsoft.com/office/powerpoint/2010/main" xmlns:a14="http://schemas.microsoft.com/office/drawing/2010/main" w="9525">
                     <a:solidFill>
                       <a:srgbClr val="000000"/>
                     </a:solidFill>
@@ -29419,7 +29802,7 @@
               </a:ln>
               <a:extLst>
                 <a:ext uri="{91240B29-F687-4f45-9708-019B960494DF}">
-                  <a14:hiddenLine xmlns:a14="http://schemas.microsoft.com/office/drawing/2010/main" xmlns:p14="http://schemas.microsoft.com/office/powerpoint/2010/main" xmlns:a16="http://schemas.microsoft.com/office/drawing/2014/main" xmlns="" w="9525">
+                  <a14:hiddenLine xmlns="" xmlns:a16="http://schemas.microsoft.com/office/drawing/2014/main" xmlns:p14="http://schemas.microsoft.com/office/powerpoint/2010/main" xmlns:a14="http://schemas.microsoft.com/office/drawing/2010/main" w="9525">
                     <a:solidFill>
                       <a:srgbClr val="000000"/>
                     </a:solidFill>
@@ -29468,7 +29851,7 @@
               </a:ln>
               <a:extLst>
                 <a:ext uri="{91240B29-F687-4f45-9708-019B960494DF}">
-                  <a14:hiddenLine xmlns:a14="http://schemas.microsoft.com/office/drawing/2010/main" xmlns:p14="http://schemas.microsoft.com/office/powerpoint/2010/main" xmlns:a16="http://schemas.microsoft.com/office/drawing/2014/main" xmlns="" w="9525">
+                  <a14:hiddenLine xmlns="" xmlns:a16="http://schemas.microsoft.com/office/drawing/2014/main" xmlns:p14="http://schemas.microsoft.com/office/powerpoint/2010/main" xmlns:a14="http://schemas.microsoft.com/office/drawing/2010/main" w="9525">
                     <a:solidFill>
                       <a:srgbClr val="000000"/>
                     </a:solidFill>
@@ -31186,6 +31569,21 @@
 </file>
 
 <file path=customXml/item1.xml><?xml version="1.0" encoding="utf-8"?>
+<?mso-contentType ?>
+<FormTemplates xmlns="http://schemas.microsoft.com/sharepoint/v3/contenttype/forms">
+  <Display>DocumentLibraryForm</Display>
+  <Edit>DocumentLibraryForm</Edit>
+  <New>DocumentLibraryForm</New>
+</FormTemplates>
+</file>
+
+<file path=customXml/item2.xml><?xml version="1.0" encoding="utf-8"?>
+<p:properties xmlns:p="http://schemas.microsoft.com/office/2006/metadata/properties" xmlns:xsi="http://www.w3.org/2001/XMLSchema-instance" xmlns:pc="http://schemas.microsoft.com/office/infopath/2007/PartnerControls">
+  <documentManagement/>
+</p:properties>
+</file>
+
+<file path=customXml/item3.xml><?xml version="1.0" encoding="utf-8"?>
 <ct:contentTypeSchema xmlns:ct="http://schemas.microsoft.com/office/2006/metadata/contentType" xmlns:ma="http://schemas.microsoft.com/office/2006/metadata/properties/metaAttributes" ct:_="" ma:_="" ma:contentTypeName="Belge" ma:contentTypeID="0x0101005C4A4B657320F049AA1D633651D5A527" ma:contentTypeVersion="10" ma:contentTypeDescription="Yeni belge oluşturun." ma:contentTypeScope="" ma:versionID="54de096795585f3fc417ea0d3572c9ae">
   <xsd:schema xmlns:xsd="http://www.w3.org/2001/XMLSchema" xmlns:xs="http://www.w3.org/2001/XMLSchema" xmlns:p="http://schemas.microsoft.com/office/2006/metadata/properties" xmlns:ns3="89b73cb6-9abe-4d87-a058-9d49bc0905c0" xmlns:ns4="ad4db333-1744-4fed-9c78-0ba4714da101" targetNamespace="http://schemas.microsoft.com/office/2006/metadata/properties" ma:root="true" ma:fieldsID="01b833e0e81877041e3895ee56010d14" ns3:_="" ns4:_="">
     <xsd:import namespace="89b73cb6-9abe-4d87-a058-9d49bc0905c0"/>
@@ -31388,36 +31786,10 @@
 </ct:contentTypeSchema>
 </file>
 
-<file path=customXml/item2.xml><?xml version="1.0" encoding="utf-8"?>
-<p:properties xmlns:p="http://schemas.microsoft.com/office/2006/metadata/properties" xmlns:xsi="http://www.w3.org/2001/XMLSchema-instance" xmlns:pc="http://schemas.microsoft.com/office/infopath/2007/PartnerControls">
-  <documentManagement/>
-</p:properties>
-</file>
-
-<file path=customXml/item3.xml><?xml version="1.0" encoding="utf-8"?>
-<?mso-contentType ?>
-<FormTemplates xmlns="http://schemas.microsoft.com/sharepoint/v3/contenttype/forms">
-  <Display>DocumentLibraryForm</Display>
-  <Edit>DocumentLibraryForm</Edit>
-  <New>DocumentLibraryForm</New>
-</FormTemplates>
-</file>
-
 <file path=customXml/itemProps1.xml><?xml version="1.0" encoding="utf-8"?>
-<ds:datastoreItem xmlns:ds="http://schemas.openxmlformats.org/officeDocument/2006/customXml" ds:itemID="{E03F3BD2-A353-4363-A8F0-A07D2AB1C10E}">
+<ds:datastoreItem xmlns:ds="http://schemas.openxmlformats.org/officeDocument/2006/customXml" ds:itemID="{C476031E-55DD-49DE-8AE4-90A67FB3FE5B}">
   <ds:schemaRefs>
-    <ds:schemaRef ds:uri="http://schemas.microsoft.com/office/2006/metadata/contentType"/>
-    <ds:schemaRef ds:uri="http://schemas.microsoft.com/office/2006/metadata/properties/metaAttributes"/>
-    <ds:schemaRef ds:uri="http://www.w3.org/2001/XMLSchema"/>
-    <ds:schemaRef ds:uri="http://schemas.microsoft.com/office/2006/metadata/properties"/>
-    <ds:schemaRef ds:uri="89b73cb6-9abe-4d87-a058-9d49bc0905c0"/>
-    <ds:schemaRef ds:uri="ad4db333-1744-4fed-9c78-0ba4714da101"/>
-    <ds:schemaRef ds:uri="http://schemas.microsoft.com/office/2006/documentManagement/types"/>
-    <ds:schemaRef ds:uri="http://schemas.microsoft.com/office/infopath/2007/PartnerControls"/>
-    <ds:schemaRef ds:uri="http://schemas.openxmlformats.org/package/2006/metadata/core-properties"/>
-    <ds:schemaRef ds:uri="http://purl.org/dc/elements/1.1/"/>
-    <ds:schemaRef ds:uri="http://purl.org/dc/terms/"/>
-    <ds:schemaRef ds:uri="http://schemas.microsoft.com/internal/obd"/>
+    <ds:schemaRef ds:uri="http://schemas.microsoft.com/sharepoint/v3/contenttype/forms"/>
   </ds:schemaRefs>
 </ds:datastoreItem>
 </file>
@@ -31440,9 +31812,20 @@
 </file>
 
 <file path=customXml/itemProps3.xml><?xml version="1.0" encoding="utf-8"?>
-<ds:datastoreItem xmlns:ds="http://schemas.openxmlformats.org/officeDocument/2006/customXml" ds:itemID="{C476031E-55DD-49DE-8AE4-90A67FB3FE5B}">
+<ds:datastoreItem xmlns:ds="http://schemas.openxmlformats.org/officeDocument/2006/customXml" ds:itemID="{E03F3BD2-A353-4363-A8F0-A07D2AB1C10E}">
   <ds:schemaRefs>
-    <ds:schemaRef ds:uri="http://schemas.microsoft.com/sharepoint/v3/contenttype/forms"/>
+    <ds:schemaRef ds:uri="http://schemas.microsoft.com/office/2006/metadata/contentType"/>
+    <ds:schemaRef ds:uri="http://schemas.microsoft.com/office/2006/metadata/properties/metaAttributes"/>
+    <ds:schemaRef ds:uri="http://www.w3.org/2001/XMLSchema"/>
+    <ds:schemaRef ds:uri="http://schemas.microsoft.com/office/2006/metadata/properties"/>
+    <ds:schemaRef ds:uri="89b73cb6-9abe-4d87-a058-9d49bc0905c0"/>
+    <ds:schemaRef ds:uri="ad4db333-1744-4fed-9c78-0ba4714da101"/>
+    <ds:schemaRef ds:uri="http://schemas.microsoft.com/office/2006/documentManagement/types"/>
+    <ds:schemaRef ds:uri="http://schemas.microsoft.com/office/infopath/2007/PartnerControls"/>
+    <ds:schemaRef ds:uri="http://schemas.openxmlformats.org/package/2006/metadata/core-properties"/>
+    <ds:schemaRef ds:uri="http://purl.org/dc/elements/1.1/"/>
+    <ds:schemaRef ds:uri="http://purl.org/dc/terms/"/>
+    <ds:schemaRef ds:uri="http://schemas.microsoft.com/internal/obd"/>
   </ds:schemaRefs>
 </ds:datastoreItem>
 </file>
</xml_diff>